<commit_message>
seems stable ver: including edit enable, adjustive foc area, several fixes
</commit_message>
<xml_diff>
--- a/docs/finalppt_f.pptx
+++ b/docs/finalppt_f.pptx
@@ -276,7 +276,7 @@
               <a:pPr>
                 <a:defRPr/>
               </a:pPr>
-              <a:t>5/26/2012</a:t>
+              <a:t>5/27/2012</a:t>
             </a:fld>
             <a:endParaRPr lang="en-US" dirty="0"/>
           </a:p>
@@ -499,7 +499,7 @@
               <a:pPr>
                 <a:defRPr/>
               </a:pPr>
-              <a:t>5/26/2012</a:t>
+              <a:t>5/27/2012</a:t>
             </a:fld>
             <a:endParaRPr lang="en-US" dirty="0"/>
           </a:p>
@@ -6040,28 +6040,21 @@
             <p:ph type="title"/>
           </p:nvPr>
         </p:nvSpPr>
-        <p:spPr/>
+        <p:spPr>
+          <a:xfrm>
+            <a:off x="561975" y="687387"/>
+            <a:ext cx="11762080" cy="1417320"/>
+          </a:xfrm>
+        </p:spPr>
         <p:txBody>
           <a:bodyPr/>
           <a:lstStyle/>
           <a:p>
             <a:r>
-              <a:rPr lang="en-US" sz="5100" dirty="0">
+              <a:rPr lang="zh-CN" altLang="en-US" sz="5100" dirty="0">
                 <a:cs typeface="Calibri" pitchFamily="34" charset="0"/>
               </a:rPr>
-              <a:t>AEC </a:t>
-            </a:r>
-            <a:r>
-              <a:rPr lang="en-US" sz="5100" dirty="0" smtClean="0">
-                <a:cs typeface="Calibri" pitchFamily="34" charset="0"/>
-              </a:rPr>
-              <a:t>Building </a:t>
-            </a:r>
-            <a:r>
-              <a:rPr lang="en-US" sz="5100" dirty="0">
-                <a:cs typeface="Calibri" pitchFamily="34" charset="0"/>
-              </a:rPr>
-              <a:t>| </a:t>
+              <a:t>课题背景</a:t>
             </a:r>
             <a:r>
               <a:rPr lang="en-US" sz="5100" dirty="0" smtClean="0">
@@ -6070,7 +6063,7 @@
                 </a:solidFill>
                 <a:cs typeface="Calibri" pitchFamily="34" charset="0"/>
               </a:rPr>
-              <a:t>AE Summit 2012 </a:t>
+              <a:t> </a:t>
             </a:r>
             <a:r>
               <a:rPr lang="en-US" dirty="0" smtClean="0">
@@ -6106,10 +6099,6 @@
                 <a:cs typeface="Calibri" pitchFamily="34" charset="0"/>
               </a:rPr>
             </a:br>
-            <a:r>
-              <a:rPr lang="en-US" sz="4600" dirty="0" smtClean="0"/>
-              <a:t>Session Agenda</a:t>
-            </a:r>
             <a:endParaRPr lang="en-US" sz="4600" dirty="0"/>
           </a:p>
         </p:txBody>
@@ -6201,10 +6190,7 @@
               <a:rPr lang="en-US" dirty="0" smtClean="0"/>
               <a:t>						</a:t>
             </a:r>
-            <a:r>
-              <a:rPr lang="en-US" sz="2000" dirty="0" smtClean="0"/>
-              <a:t>&lt;Placeholder for an FY13 image of choice here&gt;</a:t>
-            </a:r>
+            <a:endParaRPr lang="en-US" sz="2000" dirty="0" smtClean="0"/>
           </a:p>
         </p:txBody>
       </p:sp>
@@ -9423,21 +9409,6 @@
 </file>
 
 <file path=customXml/item1.xml><?xml version="1.0" encoding="utf-8"?>
-<?mso-contentType ?>
-<FormTemplates xmlns="http://schemas.microsoft.com/sharepoint/v3/contenttype/forms">
-  <Display>DocumentLibraryForm</Display>
-  <Edit>DocumentLibraryForm</Edit>
-  <New>DocumentLibraryForm</New>
-</FormTemplates>
-</file>
-
-<file path=customXml/item2.xml><?xml version="1.0" encoding="utf-8"?>
-<p:properties xmlns:p="http://schemas.microsoft.com/office/2006/metadata/properties" xmlns:xsi="http://www.w3.org/2001/XMLSchema-instance">
-  <documentManagement/>
-</p:properties>
-</file>
-
-<file path=customXml/item3.xml><?xml version="1.0" encoding="utf-8"?>
 <ct:contentTypeSchema xmlns:ct="http://schemas.microsoft.com/office/2006/metadata/contentType" xmlns:ma="http://schemas.microsoft.com/office/2006/metadata/properties/metaAttributes" ct:_="" ma:_="" ma:contentTypeName="Document" ma:contentTypeID="0x0101005C411FEDA499084183CB15D739B42D88" ma:contentTypeVersion="0" ma:contentTypeDescription="Create a new document." ma:contentTypeScope="" ma:versionID="e854bbbf40a9d17ed94d2b4b3c9444c7">
   <xsd:schema xmlns:xsd="http://www.w3.org/2001/XMLSchema" xmlns:xs="http://www.w3.org/2001/XMLSchema" xmlns:p="http://schemas.microsoft.com/office/2006/metadata/properties" targetNamespace="http://schemas.microsoft.com/office/2006/metadata/properties" ma:root="true" ma:fieldsID="393adde7ee1a707d6e9f5d1307480844">
     <xsd:element name="properties">
@@ -9551,10 +9522,33 @@
 </ct:contentTypeSchema>
 </file>
 
+<file path=customXml/item2.xml><?xml version="1.0" encoding="utf-8"?>
+<p:properties xmlns:p="http://schemas.microsoft.com/office/2006/metadata/properties" xmlns:xsi="http://www.w3.org/2001/XMLSchema-instance">
+  <documentManagement/>
+</p:properties>
+</file>
+
+<file path=customXml/item3.xml><?xml version="1.0" encoding="utf-8"?>
+<?mso-contentType ?>
+<FormTemplates xmlns="http://schemas.microsoft.com/sharepoint/v3/contenttype/forms">
+  <Display>DocumentLibraryForm</Display>
+  <Edit>DocumentLibraryForm</Edit>
+  <New>DocumentLibraryForm</New>
+</FormTemplates>
+</file>
+
 <file path=customXml/itemProps1.xml><?xml version="1.0" encoding="utf-8"?>
-<ds:datastoreItem xmlns:ds="http://schemas.openxmlformats.org/officeDocument/2006/customXml" ds:itemID="{05DE7D26-623C-4E20-905C-E4AA82C27D5E}">
+<ds:datastoreItem xmlns:ds="http://schemas.openxmlformats.org/officeDocument/2006/customXml" ds:itemID="{59F81734-0E85-41E2-B450-5A505E25DF2F}">
   <ds:schemaRefs>
-    <ds:schemaRef ds:uri="http://schemas.microsoft.com/sharepoint/v3/contenttype/forms"/>
+    <ds:schemaRef ds:uri="http://schemas.microsoft.com/office/2006/metadata/contentType"/>
+    <ds:schemaRef ds:uri="http://schemas.microsoft.com/office/2006/metadata/properties/metaAttributes"/>
+    <ds:schemaRef ds:uri="http://www.w3.org/2001/XMLSchema"/>
+    <ds:schemaRef ds:uri="http://schemas.microsoft.com/office/2006/metadata/properties"/>
+    <ds:schemaRef ds:uri="http://schemas.openxmlformats.org/package/2006/metadata/core-properties"/>
+    <ds:schemaRef ds:uri="http://purl.org/dc/elements/1.1/"/>
+    <ds:schemaRef ds:uri="http://purl.org/dc/terms/"/>
+    <ds:schemaRef ds:uri="http://schemas.microsoft.com/internal/obd"/>
+    <ds:schemaRef ds:uri="http://schemas.microsoft.com/office/infopath/2007/PartnerControls"/>
   </ds:schemaRefs>
 </ds:datastoreItem>
 </file>
@@ -9575,17 +9569,9 @@
 </file>
 
 <file path=customXml/itemProps3.xml><?xml version="1.0" encoding="utf-8"?>
-<ds:datastoreItem xmlns:ds="http://schemas.openxmlformats.org/officeDocument/2006/customXml" ds:itemID="{59F81734-0E85-41E2-B450-5A505E25DF2F}">
+<ds:datastoreItem xmlns:ds="http://schemas.openxmlformats.org/officeDocument/2006/customXml" ds:itemID="{05DE7D26-623C-4E20-905C-E4AA82C27D5E}">
   <ds:schemaRefs>
-    <ds:schemaRef ds:uri="http://schemas.microsoft.com/office/2006/metadata/contentType"/>
-    <ds:schemaRef ds:uri="http://schemas.microsoft.com/office/2006/metadata/properties/metaAttributes"/>
-    <ds:schemaRef ds:uri="http://www.w3.org/2001/XMLSchema"/>
-    <ds:schemaRef ds:uri="http://schemas.microsoft.com/office/2006/metadata/properties"/>
-    <ds:schemaRef ds:uri="http://schemas.openxmlformats.org/package/2006/metadata/core-properties"/>
-    <ds:schemaRef ds:uri="http://purl.org/dc/elements/1.1/"/>
-    <ds:schemaRef ds:uri="http://purl.org/dc/terms/"/>
-    <ds:schemaRef ds:uri="http://schemas.microsoft.com/internal/obd"/>
-    <ds:schemaRef ds:uri="http://schemas.microsoft.com/office/infopath/2007/PartnerControls"/>
+    <ds:schemaRef ds:uri="http://schemas.microsoft.com/sharepoint/v3/contenttype/forms"/>
   </ds:schemaRefs>
 </ds:datastoreItem>
 </file>
</xml_diff>

<commit_message>
pptx add 4 select...
</commit_message>
<xml_diff>
--- a/docs/finalppt_f.pptx
+++ b/docs/finalppt_f.pptx
@@ -7,29 +7,30 @@
     <p:sldMasterId id="2147483727" r:id="rId6"/>
   </p:sldMasterIdLst>
   <p:notesMasterIdLst>
-    <p:notesMasterId r:id="rId19"/>
+    <p:notesMasterId r:id="rId20"/>
   </p:notesMasterIdLst>
   <p:handoutMasterIdLst>
-    <p:handoutMasterId r:id="rId20"/>
+    <p:handoutMasterId r:id="rId21"/>
   </p:handoutMasterIdLst>
   <p:sldIdLst>
     <p:sldId id="268" r:id="rId7"/>
     <p:sldId id="275" r:id="rId8"/>
     <p:sldId id="271" r:id="rId9"/>
-    <p:sldId id="273" r:id="rId10"/>
-    <p:sldId id="279" r:id="rId11"/>
-    <p:sldId id="280" r:id="rId12"/>
-    <p:sldId id="276" r:id="rId13"/>
-    <p:sldId id="277" r:id="rId14"/>
-    <p:sldId id="278" r:id="rId15"/>
-    <p:sldId id="281" r:id="rId16"/>
-    <p:sldId id="283" r:id="rId17"/>
-    <p:sldId id="272" r:id="rId18"/>
+    <p:sldId id="284" r:id="rId10"/>
+    <p:sldId id="273" r:id="rId11"/>
+    <p:sldId id="279" r:id="rId12"/>
+    <p:sldId id="280" r:id="rId13"/>
+    <p:sldId id="276" r:id="rId14"/>
+    <p:sldId id="277" r:id="rId15"/>
+    <p:sldId id="278" r:id="rId16"/>
+    <p:sldId id="281" r:id="rId17"/>
+    <p:sldId id="283" r:id="rId18"/>
+    <p:sldId id="272" r:id="rId19"/>
   </p:sldIdLst>
   <p:sldSz cx="13011150" cy="9756775"/>
   <p:notesSz cx="7010400" cy="9296400"/>
   <p:custDataLst>
-    <p:tags r:id="rId21"/>
+    <p:tags r:id="rId22"/>
   </p:custDataLst>
   <p:defaultTextStyle>
     <a:defPPr>
@@ -1189,7 +1190,7 @@
             </a:r>
             <a:r>
               <a:rPr lang="en-US" baseline="0" dirty="0" smtClean="0"/>
-              <a:t> this format for the discussion portion of your presentation.</a:t>
+              <a:t> this format to introduce the exercise portion of your presentation.</a:t>
             </a:r>
             <a:endParaRPr lang="en-US" dirty="0"/>
           </a:p>
@@ -1227,7 +1228,7 @@
     </p:spTree>
     <p:extLst>
       <p:ext uri="{BB962C8B-B14F-4D97-AF65-F5344CB8AC3E}">
-        <p14:creationId xmlns:p14="http://schemas.microsoft.com/office/powerpoint/2010/main" val="1038207964"/>
+        <p14:creationId xmlns:p14="http://schemas.microsoft.com/office/powerpoint/2010/main" val="373331565"/>
       </p:ext>
     </p:extLst>
   </p:cSld>
@@ -1256,6 +1257,104 @@
       </p:grpSpPr>
       <p:sp>
         <p:nvSpPr>
+          <p:cNvPr id="2" name="Slide Image Placeholder 1"/>
+          <p:cNvSpPr>
+            <a:spLocks noGrp="1" noRot="1" noChangeAspect="1"/>
+          </p:cNvSpPr>
+          <p:nvPr>
+            <p:ph type="sldImg"/>
+          </p:nvPr>
+        </p:nvSpPr>
+        <p:spPr/>
+      </p:sp>
+      <p:sp>
+        <p:nvSpPr>
+          <p:cNvPr id="3" name="Notes Placeholder 2"/>
+          <p:cNvSpPr>
+            <a:spLocks noGrp="1"/>
+          </p:cNvSpPr>
+          <p:nvPr>
+            <p:ph type="body" idx="1"/>
+          </p:nvPr>
+        </p:nvSpPr>
+        <p:spPr/>
+        <p:txBody>
+          <a:bodyPr/>
+          <a:lstStyle/>
+          <a:p>
+            <a:r>
+              <a:rPr lang="en-US" dirty="0" smtClean="0"/>
+              <a:t>Use</a:t>
+            </a:r>
+            <a:r>
+              <a:rPr lang="en-US" baseline="0" dirty="0" smtClean="0"/>
+              <a:t> this format for the discussion portion of your presentation.</a:t>
+            </a:r>
+            <a:endParaRPr lang="en-US" dirty="0"/>
+          </a:p>
+        </p:txBody>
+      </p:sp>
+      <p:sp>
+        <p:nvSpPr>
+          <p:cNvPr id="4" name="Slide Number Placeholder 3"/>
+          <p:cNvSpPr>
+            <a:spLocks noGrp="1"/>
+          </p:cNvSpPr>
+          <p:nvPr>
+            <p:ph type="sldNum" sz="quarter" idx="10"/>
+          </p:nvPr>
+        </p:nvSpPr>
+        <p:spPr/>
+        <p:txBody>
+          <a:bodyPr/>
+          <a:lstStyle/>
+          <a:p>
+            <a:pPr>
+              <a:defRPr/>
+            </a:pPr>
+            <a:fld id="{9EC167E1-C60E-45A7-B40D-9629AC64C384}" type="slidenum">
+              <a:rPr lang="en-US" smtClean="0"/>
+              <a:pPr>
+                <a:defRPr/>
+              </a:pPr>
+              <a:t>12</a:t>
+            </a:fld>
+            <a:endParaRPr lang="en-US" dirty="0"/>
+          </a:p>
+        </p:txBody>
+      </p:sp>
+    </p:spTree>
+    <p:extLst>
+      <p:ext uri="{BB962C8B-B14F-4D97-AF65-F5344CB8AC3E}">
+        <p14:creationId xmlns:p14="http://schemas.microsoft.com/office/powerpoint/2010/main" val="1038207964"/>
+      </p:ext>
+    </p:extLst>
+  </p:cSld>
+  <p:clrMapOvr>
+    <a:masterClrMapping/>
+  </p:clrMapOvr>
+</p:notes>
+</file>
+
+<file path=ppt/notesSlides/notesSlide13.xml><?xml version="1.0" encoding="utf-8"?>
+<p:notes xmlns:a="http://schemas.openxmlformats.org/drawingml/2006/main" xmlns:r="http://schemas.openxmlformats.org/officeDocument/2006/relationships" xmlns:p="http://schemas.openxmlformats.org/presentationml/2006/main">
+  <p:cSld>
+    <p:spTree>
+      <p:nvGrpSpPr>
+        <p:cNvPr id="1" name=""/>
+        <p:cNvGrpSpPr/>
+        <p:nvPr/>
+      </p:nvGrpSpPr>
+      <p:grpSpPr>
+        <a:xfrm>
+          <a:off x="0" y="0"/>
+          <a:ext cx="0" cy="0"/>
+          <a:chOff x="0" y="0"/>
+          <a:chExt cx="0" cy="0"/>
+        </a:xfrm>
+      </p:grpSpPr>
+      <p:sp>
+        <p:nvSpPr>
           <p:cNvPr id="74754" name="Rectangle 7"/>
           <p:cNvSpPr>
             <a:spLocks noGrp="1" noChangeArrowheads="1"/>
@@ -1294,7 +1393,7 @@
                   <a:spcPct val="0"/>
                 </a:spcAft>
               </a:pPr>
-              <a:t>12</a:t>
+              <a:t>13</a:t>
             </a:fld>
             <a:endParaRPr lang="en-US" dirty="0">
               <a:solidFill>
@@ -1592,7 +1691,7 @@
             </a:r>
             <a:r>
               <a:rPr lang="en-US" baseline="0" dirty="0" smtClean="0"/>
-              <a:t> this format to introduce the demonstration portion of your presentation.</a:t>
+              <a:t> this format for the discussion portion of your presentation.</a:t>
             </a:r>
             <a:endParaRPr lang="en-US" dirty="0"/>
           </a:p>
@@ -1617,20 +1716,28 @@
               <a:defRPr/>
             </a:pPr>
             <a:fld id="{9EC167E1-C60E-45A7-B40D-9629AC64C384}" type="slidenum">
-              <a:rPr lang="en-US" smtClean="0"/>
+              <a:rPr lang="en-US" smtClean="0">
+                <a:solidFill>
+                  <a:prstClr val="black"/>
+                </a:solidFill>
+              </a:rPr>
               <a:pPr>
                 <a:defRPr/>
               </a:pPr>
               <a:t>4</a:t>
             </a:fld>
-            <a:endParaRPr lang="en-US" dirty="0"/>
+            <a:endParaRPr lang="en-US" dirty="0">
+              <a:solidFill>
+                <a:prstClr val="black"/>
+              </a:solidFill>
+            </a:endParaRPr>
           </a:p>
         </p:txBody>
       </p:sp>
     </p:spTree>
     <p:extLst>
       <p:ext uri="{BB962C8B-B14F-4D97-AF65-F5344CB8AC3E}">
-        <p14:creationId xmlns:p14="http://schemas.microsoft.com/office/powerpoint/2010/main" val="373331565"/>
+        <p14:creationId xmlns:p14="http://schemas.microsoft.com/office/powerpoint/2010/main" val="1038207964"/>
       </p:ext>
     </p:extLst>
   </p:cSld>
@@ -1690,7 +1797,7 @@
             </a:r>
             <a:r>
               <a:rPr lang="en-US" baseline="0" dirty="0" smtClean="0"/>
-              <a:t> this format to introduce the exercise portion of your presentation.</a:t>
+              <a:t> this format to introduce the demonstration portion of your presentation.</a:t>
             </a:r>
             <a:endParaRPr lang="en-US" dirty="0"/>
           </a:p>
@@ -1886,7 +1993,7 @@
             </a:r>
             <a:r>
               <a:rPr lang="en-US" baseline="0" dirty="0" smtClean="0"/>
-              <a:t> this format for the discussion portion of your presentation.</a:t>
+              <a:t> this format to introduce the exercise portion of your presentation.</a:t>
             </a:r>
             <a:endParaRPr lang="en-US" dirty="0"/>
           </a:p>
@@ -1924,7 +2031,7 @@
     </p:spTree>
     <p:extLst>
       <p:ext uri="{BB962C8B-B14F-4D97-AF65-F5344CB8AC3E}">
-        <p14:creationId xmlns:p14="http://schemas.microsoft.com/office/powerpoint/2010/main" val="1038207964"/>
+        <p14:creationId xmlns:p14="http://schemas.microsoft.com/office/powerpoint/2010/main" val="373331565"/>
       </p:ext>
     </p:extLst>
   </p:cSld>
@@ -1984,7 +2091,7 @@
             </a:r>
             <a:r>
               <a:rPr lang="en-US" baseline="0" dirty="0" smtClean="0"/>
-              <a:t> this format to introduce the demonstration portion of your presentation.</a:t>
+              <a:t> this format for the discussion portion of your presentation.</a:t>
             </a:r>
             <a:endParaRPr lang="en-US" dirty="0"/>
           </a:p>
@@ -2022,7 +2129,7 @@
     </p:spTree>
     <p:extLst>
       <p:ext uri="{BB962C8B-B14F-4D97-AF65-F5344CB8AC3E}">
-        <p14:creationId xmlns:p14="http://schemas.microsoft.com/office/powerpoint/2010/main" val="373331565"/>
+        <p14:creationId xmlns:p14="http://schemas.microsoft.com/office/powerpoint/2010/main" val="1038207964"/>
       </p:ext>
     </p:extLst>
   </p:cSld>
@@ -2082,7 +2189,7 @@
             </a:r>
             <a:r>
               <a:rPr lang="en-US" baseline="0" dirty="0" smtClean="0"/>
-              <a:t> this format to introduce the exercise portion of your presentation.</a:t>
+              <a:t> this format to introduce the demonstration portion of your presentation.</a:t>
             </a:r>
             <a:endParaRPr lang="en-US" dirty="0"/>
           </a:p>
@@ -5108,7 +5215,7 @@
           </a:blip>
           <a:srcRect/>
           <a:stretch>
-            <a:fillRect l="-6000" r="-6000"/>
+            <a:fillRect/>
           </a:stretch>
         </a:blipFill>
         <a:effectLst/>
@@ -5136,7 +5243,7 @@
         </p:nvSpPr>
         <p:spPr bwMode="auto">
           <a:xfrm>
-            <a:off x="18223" y="5716587"/>
+            <a:off x="0" y="5868987"/>
             <a:ext cx="13011149" cy="3135604"/>
           </a:xfrm>
           <a:prstGeom prst="rect">
@@ -5206,19 +5313,21 @@
               <a:defRPr/>
             </a:pPr>
             <a:r>
-              <a:rPr lang="zh-CN" altLang="en-US" sz="4000" b="1" dirty="0" smtClean="0">
+              <a:rPr lang="zh-CN" altLang="en-US" sz="4800" b="1" dirty="0" smtClean="0">
                 <a:solidFill>
                   <a:srgbClr val="FFFFFF"/>
                 </a:solidFill>
-                <a:latin typeface="Arial"/>
+                <a:latin typeface="黑体" pitchFamily="49" charset="-122"/>
+                <a:ea typeface="黑体" pitchFamily="49" charset="-122"/>
               </a:rPr>
               <a:t>鱼眼视图的源代码应用</a:t>
             </a:r>
-            <a:endParaRPr lang="en-US" altLang="zh-CN" sz="4000" b="1" dirty="0" smtClean="0">
+            <a:endParaRPr lang="en-US" altLang="zh-CN" sz="4800" b="1" dirty="0" smtClean="0">
               <a:solidFill>
                 <a:srgbClr val="FFFFFF"/>
               </a:solidFill>
-              <a:latin typeface="Arial"/>
+              <a:latin typeface="黑体" pitchFamily="49" charset="-122"/>
+              <a:ea typeface="黑体" pitchFamily="49" charset="-122"/>
             </a:endParaRPr>
           </a:p>
           <a:p>
@@ -5232,14 +5341,25 @@
                 </a:solidFill>
                 <a:latin typeface="Arial"/>
               </a:rPr>
-              <a:t>——Visual Studio</a:t>
+              <a:t>——</a:t>
+            </a:r>
+            <a:r>
+              <a:rPr lang="en-US" altLang="zh-CN" sz="4000" b="1" dirty="0" smtClean="0">
+                <a:solidFill>
+                  <a:srgbClr val="FFFFFF"/>
+                </a:solidFill>
+                <a:latin typeface="黑体" pitchFamily="49" charset="-122"/>
+                <a:ea typeface="黑体" pitchFamily="49" charset="-122"/>
+              </a:rPr>
+              <a:t>Visual Studio</a:t>
             </a:r>
             <a:r>
               <a:rPr lang="zh-CN" altLang="en-US" sz="4000" b="1" dirty="0" smtClean="0">
                 <a:solidFill>
                   <a:srgbClr val="FFFFFF"/>
                 </a:solidFill>
-                <a:latin typeface="Arial"/>
+                <a:latin typeface="黑体" pitchFamily="49" charset="-122"/>
+                <a:ea typeface="黑体" pitchFamily="49" charset="-122"/>
               </a:rPr>
               <a:t>编辑器扩展</a:t>
             </a:r>
@@ -5247,7 +5367,8 @@
               <a:solidFill>
                 <a:srgbClr val="FFFFFF"/>
               </a:solidFill>
-              <a:latin typeface="Arial"/>
+              <a:latin typeface="黑体" pitchFamily="49" charset="-122"/>
+              <a:ea typeface="黑体" pitchFamily="49" charset="-122"/>
             </a:endParaRPr>
           </a:p>
         </p:txBody>
@@ -5524,6 +5645,42 @@
       </p:grpSpPr>
       <p:sp>
         <p:nvSpPr>
+          <p:cNvPr id="2" name="Title 1"/>
+          <p:cNvSpPr>
+            <a:spLocks noGrp="1"/>
+          </p:cNvSpPr>
+          <p:nvPr>
+            <p:ph type="title"/>
+          </p:nvPr>
+        </p:nvSpPr>
+        <p:spPr>
+          <a:xfrm>
+            <a:off x="593725" y="4573587"/>
+            <a:ext cx="11762080" cy="3962400"/>
+          </a:xfrm>
+        </p:spPr>
+        <p:txBody>
+          <a:bodyPr/>
+          <a:lstStyle/>
+          <a:p>
+            <a:r>
+              <a:rPr lang="en-US" sz="3200" dirty="0" smtClean="0"/>
+              <a:t>&lt;Insert an image from the completed </a:t>
+            </a:r>
+            <a:r>
+              <a:rPr lang="en-US" sz="3200" dirty="0"/>
+              <a:t>e</a:t>
+            </a:r>
+            <a:r>
+              <a:rPr lang="en-US" sz="3200" dirty="0" smtClean="0"/>
+              <a:t>xercise here&gt;</a:t>
+            </a:r>
+            <a:endParaRPr lang="en-US" sz="3200" dirty="0"/>
+          </a:p>
+        </p:txBody>
+      </p:sp>
+      <p:sp>
+        <p:nvSpPr>
           <p:cNvPr id="3" name="TextBox 2"/>
           <p:cNvSpPr txBox="1"/>
           <p:nvPr/>
@@ -5531,7 +5688,7 @@
         <p:spPr>
           <a:xfrm>
             <a:off x="593725" y="481198"/>
-            <a:ext cx="7021003" cy="839257"/>
+            <a:ext cx="6758111" cy="839257"/>
           </a:xfrm>
           <a:prstGeom prst="rect">
             <a:avLst/>
@@ -5574,7 +5731,7 @@
                 <a:cs typeface="Calibri" pitchFamily="34" charset="0"/>
                 <a:sym typeface="Arial" pitchFamily="34" charset="0"/>
               </a:rPr>
-              <a:t>Summary</a:t>
+              <a:t>Exercise</a:t>
             </a:r>
             <a:endParaRPr lang="en-US" sz="4600" dirty="0"/>
           </a:p>
@@ -5589,7 +5746,7 @@
         <p:spPr>
           <a:xfrm>
             <a:off x="593726" y="1846176"/>
-            <a:ext cx="2101388" cy="562258"/>
+            <a:ext cx="3105957" cy="562258"/>
           </a:xfrm>
           <a:prstGeom prst="rect">
             <a:avLst/>
@@ -5609,7 +5766,7 @@
                 </a:solidFill>
                 <a:cs typeface="Calibri" pitchFamily="34" charset="0"/>
               </a:rPr>
-              <a:t>Summary 2</a:t>
+              <a:t>Title of Exercise 2</a:t>
             </a:r>
           </a:p>
         </p:txBody>
@@ -5623,7 +5780,7 @@
         <p:spPr>
           <a:xfrm>
             <a:off x="1171575" y="2408434"/>
-            <a:ext cx="7570534" cy="3293209"/>
+            <a:ext cx="7104830" cy="1692771"/>
           </a:xfrm>
           <a:prstGeom prst="rect">
             <a:avLst/>
@@ -5635,7 +5792,10 @@
           </a:bodyPr>
           <a:lstStyle/>
           <a:p>
-            <a:endParaRPr lang="en-US" dirty="0" smtClean="0"/>
+            <a:r>
+              <a:rPr lang="en-US" dirty="0" smtClean="0"/>
+              <a:t>In this Exercise you will perform the following:</a:t>
+            </a:r>
           </a:p>
           <a:p>
             <a:pPr marL="514350" indent="-514350">
@@ -5644,7 +5804,7 @@
             </a:pPr>
             <a:r>
               <a:rPr lang="en-US" dirty="0" smtClean="0"/>
-              <a:t>Target Audience (address as possible)</a:t>
+              <a:t>Bullet point</a:t>
             </a:r>
           </a:p>
           <a:p>
@@ -5654,15 +5814,7 @@
             </a:pPr>
             <a:r>
               <a:rPr lang="en-US" dirty="0" smtClean="0"/>
-              <a:t>Opportunity (</a:t>
-            </a:r>
-            <a:r>
-              <a:rPr lang="en-US" dirty="0"/>
-              <a:t>address as possible</a:t>
-            </a:r>
-            <a:r>
-              <a:rPr lang="en-US" dirty="0" smtClean="0"/>
-              <a:t>)</a:t>
+              <a:t>Bullet point</a:t>
             </a:r>
           </a:p>
           <a:p>
@@ -5672,61 +5824,8 @@
             </a:pPr>
             <a:r>
               <a:rPr lang="en-US" dirty="0" smtClean="0"/>
-              <a:t>Benefits (</a:t>
-            </a:r>
-            <a:r>
-              <a:rPr lang="en-US" dirty="0"/>
-              <a:t>address as possible</a:t>
-            </a:r>
-            <a:r>
-              <a:rPr lang="en-US" dirty="0" smtClean="0"/>
-              <a:t>)</a:t>
-            </a:r>
-          </a:p>
-          <a:p>
-            <a:pPr marL="514350" indent="-514350">
-              <a:buFont typeface="Arial" pitchFamily="34" charset="0"/>
-              <a:buChar char="•"/>
-            </a:pPr>
-            <a:r>
-              <a:rPr lang="en-US" dirty="0" smtClean="0"/>
-              <a:t>Competitive Advantages (</a:t>
-            </a:r>
-            <a:r>
-              <a:rPr lang="en-US" dirty="0"/>
-              <a:t>address as possible</a:t>
-            </a:r>
-            <a:r>
-              <a:rPr lang="en-US" dirty="0" smtClean="0"/>
-              <a:t>)</a:t>
-            </a:r>
-          </a:p>
-          <a:p>
-            <a:pPr marL="514350" indent="-514350">
-              <a:buFont typeface="Arial" pitchFamily="34" charset="0"/>
-              <a:buChar char="•"/>
-            </a:pPr>
-            <a:r>
-              <a:rPr lang="en-US" dirty="0" smtClean="0"/>
-              <a:t>Objection Handling (</a:t>
-            </a:r>
-            <a:r>
-              <a:rPr lang="en-US" dirty="0"/>
-              <a:t>address as possible)</a:t>
-            </a:r>
-          </a:p>
-          <a:p>
-            <a:pPr marL="514350" indent="-514350">
-              <a:buFont typeface="Arial" pitchFamily="34" charset="0"/>
-              <a:buChar char="•"/>
-            </a:pPr>
-            <a:endParaRPr lang="en-US" dirty="0" smtClean="0"/>
-          </a:p>
-          <a:p>
-            <a:pPr marL="514350" indent="-514350">
-              <a:buFont typeface="Arial" pitchFamily="34" charset="0"/>
-              <a:buChar char="•"/>
-            </a:pPr>
+              <a:t>Bullet point</a:t>
+            </a:r>
             <a:endParaRPr lang="en-US" dirty="0"/>
           </a:p>
         </p:txBody>
@@ -5734,7 +5833,7 @@
     </p:spTree>
     <p:extLst>
       <p:ext uri="{BB962C8B-B14F-4D97-AF65-F5344CB8AC3E}">
-        <p14:creationId xmlns:p14="http://schemas.microsoft.com/office/powerpoint/2010/main" val="4273612428"/>
+        <p14:creationId xmlns:p14="http://schemas.microsoft.com/office/powerpoint/2010/main" val="2752331491"/>
       </p:ext>
     </p:extLst>
   </p:cSld>
@@ -5764,6 +5863,246 @@
       </p:grpSpPr>
       <p:sp>
         <p:nvSpPr>
+          <p:cNvPr id="3" name="TextBox 2"/>
+          <p:cNvSpPr txBox="1"/>
+          <p:nvPr/>
+        </p:nvSpPr>
+        <p:spPr>
+          <a:xfrm>
+            <a:off x="593725" y="481198"/>
+            <a:ext cx="7021003" cy="839257"/>
+          </a:xfrm>
+          <a:prstGeom prst="rect">
+            <a:avLst/>
+          </a:prstGeom>
+          <a:noFill/>
+        </p:spPr>
+        <p:txBody>
+          <a:bodyPr wrap="none" lIns="130101" tIns="65050" rIns="130101" bIns="65050" rtlCol="0">
+            <a:spAutoFit/>
+          </a:bodyPr>
+          <a:lstStyle/>
+          <a:p>
+            <a:r>
+              <a:rPr lang="en-US" sz="4600" kern="0" dirty="0" smtClean="0">
+                <a:solidFill>
+                  <a:srgbClr val="FFFFFF"/>
+                </a:solidFill>
+                <a:latin typeface="Calibri" pitchFamily="34" charset="0"/>
+                <a:cs typeface="Calibri" pitchFamily="34" charset="0"/>
+                <a:sym typeface="Arial" pitchFamily="34" charset="0"/>
+              </a:rPr>
+              <a:t>AEC AE Summit </a:t>
+            </a:r>
+            <a:r>
+              <a:rPr lang="en-US" sz="4600" kern="0" dirty="0">
+                <a:solidFill>
+                  <a:srgbClr val="FFFFFF"/>
+                </a:solidFill>
+                <a:latin typeface="Calibri" pitchFamily="34" charset="0"/>
+                <a:cs typeface="Calibri" pitchFamily="34" charset="0"/>
+                <a:sym typeface="Arial" pitchFamily="34" charset="0"/>
+              </a:rPr>
+              <a:t>| </a:t>
+            </a:r>
+            <a:r>
+              <a:rPr lang="en-US" sz="4600" dirty="0" smtClean="0">
+                <a:solidFill>
+                  <a:srgbClr val="FFAA00"/>
+                </a:solidFill>
+                <a:cs typeface="Calibri" pitchFamily="34" charset="0"/>
+                <a:sym typeface="Arial" pitchFamily="34" charset="0"/>
+              </a:rPr>
+              <a:t>Summary</a:t>
+            </a:r>
+            <a:endParaRPr lang="en-US" sz="4600" dirty="0"/>
+          </a:p>
+        </p:txBody>
+      </p:sp>
+      <p:sp>
+        <p:nvSpPr>
+          <p:cNvPr id="4" name="TextBox 3"/>
+          <p:cNvSpPr txBox="1"/>
+          <p:nvPr/>
+        </p:nvSpPr>
+        <p:spPr>
+          <a:xfrm>
+            <a:off x="593726" y="1846176"/>
+            <a:ext cx="2101388" cy="562258"/>
+          </a:xfrm>
+          <a:prstGeom prst="rect">
+            <a:avLst/>
+          </a:prstGeom>
+          <a:noFill/>
+        </p:spPr>
+        <p:txBody>
+          <a:bodyPr wrap="none" lIns="130101" tIns="65050" rIns="130101" bIns="65050" rtlCol="0">
+            <a:spAutoFit/>
+          </a:bodyPr>
+          <a:lstStyle/>
+          <a:p>
+            <a:r>
+              <a:rPr lang="en-US" sz="2800" dirty="0" smtClean="0">
+                <a:solidFill>
+                  <a:srgbClr val="FFAA00"/>
+                </a:solidFill>
+                <a:cs typeface="Calibri" pitchFamily="34" charset="0"/>
+              </a:rPr>
+              <a:t>Summary 2</a:t>
+            </a:r>
+          </a:p>
+        </p:txBody>
+      </p:sp>
+      <p:sp>
+        <p:nvSpPr>
+          <p:cNvPr id="5" name="Rectangle 4"/>
+          <p:cNvSpPr/>
+          <p:nvPr/>
+        </p:nvSpPr>
+        <p:spPr>
+          <a:xfrm>
+            <a:off x="1171575" y="2408434"/>
+            <a:ext cx="7570534" cy="3293209"/>
+          </a:xfrm>
+          <a:prstGeom prst="rect">
+            <a:avLst/>
+          </a:prstGeom>
+        </p:spPr>
+        <p:txBody>
+          <a:bodyPr wrap="none">
+            <a:spAutoFit/>
+          </a:bodyPr>
+          <a:lstStyle/>
+          <a:p>
+            <a:endParaRPr lang="en-US" dirty="0" smtClean="0"/>
+          </a:p>
+          <a:p>
+            <a:pPr marL="514350" indent="-514350">
+              <a:buFont typeface="Arial" pitchFamily="34" charset="0"/>
+              <a:buChar char="•"/>
+            </a:pPr>
+            <a:r>
+              <a:rPr lang="en-US" dirty="0" smtClean="0"/>
+              <a:t>Target Audience (address as possible)</a:t>
+            </a:r>
+          </a:p>
+          <a:p>
+            <a:pPr marL="514350" indent="-514350">
+              <a:buFont typeface="Arial" pitchFamily="34" charset="0"/>
+              <a:buChar char="•"/>
+            </a:pPr>
+            <a:r>
+              <a:rPr lang="en-US" dirty="0" smtClean="0"/>
+              <a:t>Opportunity (</a:t>
+            </a:r>
+            <a:r>
+              <a:rPr lang="en-US" dirty="0"/>
+              <a:t>address as possible</a:t>
+            </a:r>
+            <a:r>
+              <a:rPr lang="en-US" dirty="0" smtClean="0"/>
+              <a:t>)</a:t>
+            </a:r>
+          </a:p>
+          <a:p>
+            <a:pPr marL="514350" indent="-514350">
+              <a:buFont typeface="Arial" pitchFamily="34" charset="0"/>
+              <a:buChar char="•"/>
+            </a:pPr>
+            <a:r>
+              <a:rPr lang="en-US" dirty="0" smtClean="0"/>
+              <a:t>Benefits (</a:t>
+            </a:r>
+            <a:r>
+              <a:rPr lang="en-US" dirty="0"/>
+              <a:t>address as possible</a:t>
+            </a:r>
+            <a:r>
+              <a:rPr lang="en-US" dirty="0" smtClean="0"/>
+              <a:t>)</a:t>
+            </a:r>
+          </a:p>
+          <a:p>
+            <a:pPr marL="514350" indent="-514350">
+              <a:buFont typeface="Arial" pitchFamily="34" charset="0"/>
+              <a:buChar char="•"/>
+            </a:pPr>
+            <a:r>
+              <a:rPr lang="en-US" dirty="0" smtClean="0"/>
+              <a:t>Competitive Advantages (</a:t>
+            </a:r>
+            <a:r>
+              <a:rPr lang="en-US" dirty="0"/>
+              <a:t>address as possible</a:t>
+            </a:r>
+            <a:r>
+              <a:rPr lang="en-US" dirty="0" smtClean="0"/>
+              <a:t>)</a:t>
+            </a:r>
+          </a:p>
+          <a:p>
+            <a:pPr marL="514350" indent="-514350">
+              <a:buFont typeface="Arial" pitchFamily="34" charset="0"/>
+              <a:buChar char="•"/>
+            </a:pPr>
+            <a:r>
+              <a:rPr lang="en-US" dirty="0" smtClean="0"/>
+              <a:t>Objection Handling (</a:t>
+            </a:r>
+            <a:r>
+              <a:rPr lang="en-US" dirty="0"/>
+              <a:t>address as possible)</a:t>
+            </a:r>
+          </a:p>
+          <a:p>
+            <a:pPr marL="514350" indent="-514350">
+              <a:buFont typeface="Arial" pitchFamily="34" charset="0"/>
+              <a:buChar char="•"/>
+            </a:pPr>
+            <a:endParaRPr lang="en-US" dirty="0" smtClean="0"/>
+          </a:p>
+          <a:p>
+            <a:pPr marL="514350" indent="-514350">
+              <a:buFont typeface="Arial" pitchFamily="34" charset="0"/>
+              <a:buChar char="•"/>
+            </a:pPr>
+            <a:endParaRPr lang="en-US" dirty="0"/>
+          </a:p>
+        </p:txBody>
+      </p:sp>
+    </p:spTree>
+    <p:extLst>
+      <p:ext uri="{BB962C8B-B14F-4D97-AF65-F5344CB8AC3E}">
+        <p14:creationId xmlns:p14="http://schemas.microsoft.com/office/powerpoint/2010/main" val="4273612428"/>
+      </p:ext>
+    </p:extLst>
+  </p:cSld>
+  <p:clrMapOvr>
+    <a:masterClrMapping/>
+  </p:clrMapOvr>
+  <p:transition/>
+</p:sld>
+</file>
+
+<file path=ppt/slides/slide12.xml><?xml version="1.0" encoding="utf-8"?>
+<p:sld xmlns:a="http://schemas.openxmlformats.org/drawingml/2006/main" xmlns:r="http://schemas.openxmlformats.org/officeDocument/2006/relationships" xmlns:p="http://schemas.openxmlformats.org/presentationml/2006/main">
+  <p:cSld>
+    <p:spTree>
+      <p:nvGrpSpPr>
+        <p:cNvPr id="1" name=""/>
+        <p:cNvGrpSpPr/>
+        <p:nvPr/>
+      </p:nvGrpSpPr>
+      <p:grpSpPr>
+        <a:xfrm>
+          <a:off x="0" y="0"/>
+          <a:ext cx="0" cy="0"/>
+          <a:chOff x="0" y="0"/>
+          <a:chExt cx="0" cy="0"/>
+        </a:xfrm>
+      </p:grpSpPr>
+      <p:sp>
+        <p:nvSpPr>
           <p:cNvPr id="2" name="Title 1"/>
           <p:cNvSpPr>
             <a:spLocks noGrp="1"/>
@@ -5914,7 +6253,7 @@
 </p:sld>
 </file>
 
-<file path=ppt/slides/slide12.xml><?xml version="1.0" encoding="utf-8"?>
+<file path=ppt/slides/slide13.xml><?xml version="1.0" encoding="utf-8"?>
 <p:sld xmlns:a="http://schemas.openxmlformats.org/drawingml/2006/main" xmlns:r="http://schemas.openxmlformats.org/officeDocument/2006/relationships" xmlns:p="http://schemas.openxmlformats.org/presentationml/2006/main">
   <p:cSld>
     <p:spTree>
@@ -6042,7 +6381,7 @@
         </p:nvSpPr>
         <p:spPr>
           <a:xfrm>
-            <a:off x="561975" y="687387"/>
+            <a:off x="638175" y="763587"/>
             <a:ext cx="11762080" cy="1417320"/>
           </a:xfrm>
         </p:spPr>
@@ -6052,6 +6391,8 @@
           <a:p>
             <a:r>
               <a:rPr lang="zh-CN" altLang="en-US" sz="5100" dirty="0">
+                <a:latin typeface="黑体" pitchFamily="49" charset="-122"/>
+                <a:ea typeface="黑体" pitchFamily="49" charset="-122"/>
                 <a:cs typeface="Calibri" pitchFamily="34" charset="0"/>
               </a:rPr>
               <a:t>课题背景</a:t>
@@ -6113,70 +6454,145 @@
             <p:ph idx="1"/>
           </p:nvPr>
         </p:nvSpPr>
-        <p:spPr/>
+        <p:spPr>
+          <a:xfrm>
+            <a:off x="561975" y="1449387"/>
+            <a:ext cx="11762080" cy="6699652"/>
+          </a:xfrm>
+        </p:spPr>
         <p:txBody>
           <a:bodyPr>
-            <a:normAutofit/>
+            <a:normAutofit fontScale="32500" lnSpcReduction="20000"/>
           </a:bodyPr>
           <a:lstStyle/>
           <a:p>
             <a:endParaRPr lang="en-US" dirty="0" smtClean="0"/>
           </a:p>
           <a:p>
-            <a:r>
-              <a:rPr lang="en-US" dirty="0" smtClean="0"/>
-              <a:t>Topic Item 1</a:t>
-            </a:r>
+            <a:pPr>
+              <a:spcAft>
+                <a:spcPts val="1800"/>
+              </a:spcAft>
+            </a:pPr>
+            <a:r>
+              <a:rPr lang="zh-CN" altLang="en-US" sz="9800" dirty="0" smtClean="0"/>
+              <a:t>软件开发是一项复杂的劳动</a:t>
+            </a:r>
+            <a:endParaRPr lang="en-US" sz="9800" dirty="0"/>
+          </a:p>
+          <a:p>
+            <a:pPr>
+              <a:spcAft>
+                <a:spcPts val="1800"/>
+              </a:spcAft>
+            </a:pPr>
+            <a:r>
+              <a:rPr lang="zh-CN" altLang="en-US" sz="9800" dirty="0" smtClean="0"/>
+              <a:t>软件系统规模不断增大</a:t>
+            </a:r>
+            <a:endParaRPr lang="en-US" altLang="zh-CN" sz="9800" dirty="0" smtClean="0"/>
+          </a:p>
+          <a:p>
+            <a:pPr>
+              <a:spcAft>
+                <a:spcPts val="1800"/>
+              </a:spcAft>
+            </a:pPr>
+            <a:r>
+              <a:rPr lang="zh-CN" altLang="en-US" sz="9800" dirty="0" smtClean="0"/>
+              <a:t>如何提</a:t>
+            </a:r>
+            <a:r>
+              <a:rPr lang="zh-CN" altLang="en-US" sz="9800" dirty="0"/>
+              <a:t>高软件开</a:t>
+            </a:r>
+            <a:r>
+              <a:rPr lang="zh-CN" altLang="en-US" sz="9800" dirty="0" smtClean="0"/>
+              <a:t>发</a:t>
+            </a:r>
+            <a:r>
+              <a:rPr lang="zh-CN" altLang="en-US" sz="9800" dirty="0"/>
+              <a:t>效</a:t>
+            </a:r>
+            <a:r>
+              <a:rPr lang="zh-CN" altLang="en-US" sz="9800" dirty="0" smtClean="0"/>
+              <a:t>率？</a:t>
+            </a:r>
+            <a:endParaRPr lang="en-US" altLang="zh-CN" sz="9800" dirty="0" smtClean="0"/>
+          </a:p>
+          <a:p>
+            <a:pPr lvl="1">
+              <a:spcAft>
+                <a:spcPts val="1800"/>
+              </a:spcAft>
+            </a:pPr>
+            <a:r>
+              <a:rPr lang="zh-CN" altLang="en-US" sz="12300" dirty="0" smtClean="0"/>
+              <a:t>源代码的浏览与编辑</a:t>
+            </a:r>
+            <a:endParaRPr lang="en-US" altLang="zh-CN" sz="12300" dirty="0"/>
+          </a:p>
+          <a:p>
+            <a:pPr lvl="2">
+              <a:spcAft>
+                <a:spcPts val="1800"/>
+              </a:spcAft>
+            </a:pPr>
+            <a:r>
+              <a:rPr lang="zh-CN" altLang="en-US" sz="14800" dirty="0" smtClean="0"/>
+              <a:t>鱼眼视图理论</a:t>
+            </a:r>
+            <a:endParaRPr lang="en-US" altLang="zh-CN" sz="14800" dirty="0" smtClean="0"/>
+          </a:p>
+          <a:p>
+            <a:pPr lvl="2">
+              <a:spcAft>
+                <a:spcPts val="1800"/>
+              </a:spcAft>
+            </a:pPr>
+            <a:r>
+              <a:rPr lang="en-US" altLang="zh-CN" sz="14800" dirty="0" smtClean="0"/>
+              <a:t>Visual Studio</a:t>
+            </a:r>
+            <a:r>
+              <a:rPr lang="zh-CN" altLang="en-US" sz="14800" dirty="0" smtClean="0"/>
+              <a:t>编辑器的扩展</a:t>
+            </a:r>
+            <a:endParaRPr lang="en-US" altLang="zh-CN" sz="14800" dirty="0" smtClean="0"/>
+          </a:p>
+          <a:p>
+            <a:pPr lvl="2">
+              <a:spcAft>
+                <a:spcPts val="1800"/>
+              </a:spcAft>
+            </a:pPr>
+            <a:endParaRPr lang="en-US" altLang="zh-CN" dirty="0" smtClean="0"/>
+          </a:p>
+          <a:p>
+            <a:pPr lvl="1">
+              <a:spcAft>
+                <a:spcPts val="1800"/>
+              </a:spcAft>
+            </a:pPr>
+            <a:endParaRPr lang="en-US" altLang="zh-CN" dirty="0" smtClean="0"/>
+          </a:p>
+          <a:p>
+            <a:pPr lvl="1">
+              <a:spcAft>
+                <a:spcPts val="1800"/>
+              </a:spcAft>
+            </a:pPr>
+            <a:endParaRPr lang="en-US" altLang="zh-CN" dirty="0" smtClean="0"/>
+          </a:p>
+          <a:p>
+            <a:pPr>
+              <a:spcAft>
+                <a:spcPts val="600"/>
+              </a:spcAft>
+            </a:pPr>
             <a:endParaRPr lang="en-US" dirty="0"/>
           </a:p>
           <a:p>
-            <a:r>
-              <a:rPr lang="en-US" dirty="0"/>
-              <a:t>Topic Item </a:t>
-            </a:r>
-            <a:r>
-              <a:rPr lang="en-US" dirty="0" smtClean="0"/>
-              <a:t>2</a:t>
-            </a:r>
-            <a:endParaRPr lang="en-US" dirty="0"/>
-          </a:p>
-          <a:p>
-            <a:r>
-              <a:rPr lang="en-US" dirty="0"/>
-              <a:t>Topic Item </a:t>
-            </a:r>
-            <a:r>
-              <a:rPr lang="en-US" dirty="0" smtClean="0"/>
-              <a:t>3</a:t>
-            </a:r>
-            <a:endParaRPr lang="en-US" dirty="0"/>
-          </a:p>
-          <a:p>
-            <a:r>
-              <a:rPr lang="en-US" dirty="0"/>
-              <a:t>Topic Item </a:t>
-            </a:r>
-            <a:r>
-              <a:rPr lang="en-US" dirty="0" smtClean="0"/>
-              <a:t>4</a:t>
-            </a:r>
-            <a:endParaRPr lang="en-US" dirty="0"/>
-          </a:p>
-          <a:p>
-            <a:r>
-              <a:rPr lang="en-US" dirty="0"/>
-              <a:t>Topic Item </a:t>
-            </a:r>
-            <a:r>
-              <a:rPr lang="en-US" dirty="0" smtClean="0"/>
-              <a:t>5</a:t>
-            </a:r>
-          </a:p>
-          <a:p>
-            <a:r>
-              <a:rPr lang="en-US" dirty="0" smtClean="0"/>
-              <a:t>Session Summary</a:t>
-            </a:r>
             <a:endParaRPr lang="en-US" dirty="0"/>
           </a:p>
           <a:p>
@@ -6208,7 +6624,340 @@
   <p:timing>
     <p:tnLst>
       <p:par>
-        <p:cTn id="1" dur="indefinite" restart="never" nodeType="tmRoot"/>
+        <p:cTn id="1" dur="indefinite" restart="never" nodeType="tmRoot">
+          <p:childTnLst>
+            <p:seq concurrent="1" nextAc="seek">
+              <p:cTn id="2" dur="indefinite" nodeType="mainSeq">
+                <p:childTnLst>
+                  <p:par>
+                    <p:cTn id="3" fill="hold">
+                      <p:stCondLst>
+                        <p:cond delay="indefinite"/>
+                      </p:stCondLst>
+                      <p:childTnLst>
+                        <p:par>
+                          <p:cTn id="4" fill="hold">
+                            <p:stCondLst>
+                              <p:cond delay="0"/>
+                            </p:stCondLst>
+                            <p:childTnLst>
+                              <p:par>
+                                <p:cTn id="5" presetID="10" presetClass="entr" presetSubtype="0" fill="hold" nodeType="clickEffect">
+                                  <p:stCondLst>
+                                    <p:cond delay="0"/>
+                                  </p:stCondLst>
+                                  <p:childTnLst>
+                                    <p:set>
+                                      <p:cBhvr>
+                                        <p:cTn id="6" dur="1" fill="hold">
+                                          <p:stCondLst>
+                                            <p:cond delay="0"/>
+                                          </p:stCondLst>
+                                        </p:cTn>
+                                        <p:tgtEl>
+                                          <p:spTgt spid="71682">
+                                            <p:txEl>
+                                              <p:pRg st="3" end="3"/>
+                                            </p:txEl>
+                                          </p:spTgt>
+                                        </p:tgtEl>
+                                        <p:attrNameLst>
+                                          <p:attrName>style.visibility</p:attrName>
+                                        </p:attrNameLst>
+                                      </p:cBhvr>
+                                      <p:to>
+                                        <p:strVal val="visible"/>
+                                      </p:to>
+                                    </p:set>
+                                    <p:animEffect transition="in" filter="fade">
+                                      <p:cBhvr>
+                                        <p:cTn id="7" dur="500"/>
+                                        <p:tgtEl>
+                                          <p:spTgt spid="71682">
+                                            <p:txEl>
+                                              <p:pRg st="3" end="3"/>
+                                            </p:txEl>
+                                          </p:spTgt>
+                                        </p:tgtEl>
+                                      </p:cBhvr>
+                                    </p:animEffect>
+                                  </p:childTnLst>
+                                </p:cTn>
+                              </p:par>
+                            </p:childTnLst>
+                          </p:cTn>
+                        </p:par>
+                      </p:childTnLst>
+                    </p:cTn>
+                  </p:par>
+                  <p:par>
+                    <p:cTn id="8" fill="hold">
+                      <p:stCondLst>
+                        <p:cond delay="indefinite"/>
+                      </p:stCondLst>
+                      <p:childTnLst>
+                        <p:par>
+                          <p:cTn id="9" fill="hold">
+                            <p:stCondLst>
+                              <p:cond delay="0"/>
+                            </p:stCondLst>
+                            <p:childTnLst>
+                              <p:par>
+                                <p:cTn id="10" presetID="10" presetClass="entr" presetSubtype="0" fill="hold" nodeType="clickEffect">
+                                  <p:stCondLst>
+                                    <p:cond delay="0"/>
+                                  </p:stCondLst>
+                                  <p:childTnLst>
+                                    <p:set>
+                                      <p:cBhvr>
+                                        <p:cTn id="11" dur="1" fill="hold">
+                                          <p:stCondLst>
+                                            <p:cond delay="0"/>
+                                          </p:stCondLst>
+                                        </p:cTn>
+                                        <p:tgtEl>
+                                          <p:spTgt spid="71682">
+                                            <p:txEl>
+                                              <p:pRg st="4" end="4"/>
+                                            </p:txEl>
+                                          </p:spTgt>
+                                        </p:tgtEl>
+                                        <p:attrNameLst>
+                                          <p:attrName>style.visibility</p:attrName>
+                                        </p:attrNameLst>
+                                      </p:cBhvr>
+                                      <p:to>
+                                        <p:strVal val="visible"/>
+                                      </p:to>
+                                    </p:set>
+                                    <p:animEffect transition="in" filter="fade">
+                                      <p:cBhvr>
+                                        <p:cTn id="12" dur="500"/>
+                                        <p:tgtEl>
+                                          <p:spTgt spid="71682">
+                                            <p:txEl>
+                                              <p:pRg st="4" end="4"/>
+                                            </p:txEl>
+                                          </p:spTgt>
+                                        </p:tgtEl>
+                                      </p:cBhvr>
+                                    </p:animEffect>
+                                  </p:childTnLst>
+                                </p:cTn>
+                              </p:par>
+                            </p:childTnLst>
+                          </p:cTn>
+                        </p:par>
+                      </p:childTnLst>
+                    </p:cTn>
+                  </p:par>
+                  <p:par>
+                    <p:cTn id="13" fill="hold">
+                      <p:stCondLst>
+                        <p:cond delay="indefinite"/>
+                      </p:stCondLst>
+                      <p:childTnLst>
+                        <p:par>
+                          <p:cTn id="14" fill="hold">
+                            <p:stCondLst>
+                              <p:cond delay="0"/>
+                            </p:stCondLst>
+                            <p:childTnLst>
+                              <p:par>
+                                <p:cTn id="15" presetID="2" presetClass="entr" presetSubtype="4" fill="hold" nodeType="clickEffect">
+                                  <p:stCondLst>
+                                    <p:cond delay="0"/>
+                                  </p:stCondLst>
+                                  <p:childTnLst>
+                                    <p:set>
+                                      <p:cBhvr>
+                                        <p:cTn id="16" dur="1" fill="hold">
+                                          <p:stCondLst>
+                                            <p:cond delay="0"/>
+                                          </p:stCondLst>
+                                        </p:cTn>
+                                        <p:tgtEl>
+                                          <p:spTgt spid="71682">
+                                            <p:txEl>
+                                              <p:pRg st="5" end="5"/>
+                                            </p:txEl>
+                                          </p:spTgt>
+                                        </p:tgtEl>
+                                        <p:attrNameLst>
+                                          <p:attrName>style.visibility</p:attrName>
+                                        </p:attrNameLst>
+                                      </p:cBhvr>
+                                      <p:to>
+                                        <p:strVal val="visible"/>
+                                      </p:to>
+                                    </p:set>
+                                    <p:anim calcmode="lin" valueType="num">
+                                      <p:cBhvr additive="base">
+                                        <p:cTn id="17" dur="500" fill="hold"/>
+                                        <p:tgtEl>
+                                          <p:spTgt spid="71682">
+                                            <p:txEl>
+                                              <p:pRg st="5" end="5"/>
+                                            </p:txEl>
+                                          </p:spTgt>
+                                        </p:tgtEl>
+                                        <p:attrNameLst>
+                                          <p:attrName>ppt_x</p:attrName>
+                                        </p:attrNameLst>
+                                      </p:cBhvr>
+                                      <p:tavLst>
+                                        <p:tav tm="0">
+                                          <p:val>
+                                            <p:strVal val="#ppt_x"/>
+                                          </p:val>
+                                        </p:tav>
+                                        <p:tav tm="100000">
+                                          <p:val>
+                                            <p:strVal val="#ppt_x"/>
+                                          </p:val>
+                                        </p:tav>
+                                      </p:tavLst>
+                                    </p:anim>
+                                    <p:anim calcmode="lin" valueType="num">
+                                      <p:cBhvr additive="base">
+                                        <p:cTn id="18" dur="500" fill="hold"/>
+                                        <p:tgtEl>
+                                          <p:spTgt spid="71682">
+                                            <p:txEl>
+                                              <p:pRg st="5" end="5"/>
+                                            </p:txEl>
+                                          </p:spTgt>
+                                        </p:tgtEl>
+                                        <p:attrNameLst>
+                                          <p:attrName>ppt_y</p:attrName>
+                                        </p:attrNameLst>
+                                      </p:cBhvr>
+                                      <p:tavLst>
+                                        <p:tav tm="0">
+                                          <p:val>
+                                            <p:strVal val="1+#ppt_h/2"/>
+                                          </p:val>
+                                        </p:tav>
+                                        <p:tav tm="100000">
+                                          <p:val>
+                                            <p:strVal val="#ppt_y"/>
+                                          </p:val>
+                                        </p:tav>
+                                      </p:tavLst>
+                                    </p:anim>
+                                  </p:childTnLst>
+                                </p:cTn>
+                              </p:par>
+                              <p:par>
+                                <p:cTn id="19" presetID="2" presetClass="entr" presetSubtype="4" fill="hold" nodeType="withEffect">
+                                  <p:stCondLst>
+                                    <p:cond delay="0"/>
+                                  </p:stCondLst>
+                                  <p:childTnLst>
+                                    <p:set>
+                                      <p:cBhvr>
+                                        <p:cTn id="20" dur="1" fill="hold">
+                                          <p:stCondLst>
+                                            <p:cond delay="0"/>
+                                          </p:stCondLst>
+                                        </p:cTn>
+                                        <p:tgtEl>
+                                          <p:spTgt spid="71682">
+                                            <p:txEl>
+                                              <p:pRg st="6" end="6"/>
+                                            </p:txEl>
+                                          </p:spTgt>
+                                        </p:tgtEl>
+                                        <p:attrNameLst>
+                                          <p:attrName>style.visibility</p:attrName>
+                                        </p:attrNameLst>
+                                      </p:cBhvr>
+                                      <p:to>
+                                        <p:strVal val="visible"/>
+                                      </p:to>
+                                    </p:set>
+                                    <p:anim calcmode="lin" valueType="num">
+                                      <p:cBhvr additive="base">
+                                        <p:cTn id="21" dur="500" fill="hold"/>
+                                        <p:tgtEl>
+                                          <p:spTgt spid="71682">
+                                            <p:txEl>
+                                              <p:pRg st="6" end="6"/>
+                                            </p:txEl>
+                                          </p:spTgt>
+                                        </p:tgtEl>
+                                        <p:attrNameLst>
+                                          <p:attrName>ppt_x</p:attrName>
+                                        </p:attrNameLst>
+                                      </p:cBhvr>
+                                      <p:tavLst>
+                                        <p:tav tm="0">
+                                          <p:val>
+                                            <p:strVal val="#ppt_x"/>
+                                          </p:val>
+                                        </p:tav>
+                                        <p:tav tm="100000">
+                                          <p:val>
+                                            <p:strVal val="#ppt_x"/>
+                                          </p:val>
+                                        </p:tav>
+                                      </p:tavLst>
+                                    </p:anim>
+                                    <p:anim calcmode="lin" valueType="num">
+                                      <p:cBhvr additive="base">
+                                        <p:cTn id="22" dur="500" fill="hold"/>
+                                        <p:tgtEl>
+                                          <p:spTgt spid="71682">
+                                            <p:txEl>
+                                              <p:pRg st="6" end="6"/>
+                                            </p:txEl>
+                                          </p:spTgt>
+                                        </p:tgtEl>
+                                        <p:attrNameLst>
+                                          <p:attrName>ppt_y</p:attrName>
+                                        </p:attrNameLst>
+                                      </p:cBhvr>
+                                      <p:tavLst>
+                                        <p:tav tm="0">
+                                          <p:val>
+                                            <p:strVal val="1+#ppt_h/2"/>
+                                          </p:val>
+                                        </p:tav>
+                                        <p:tav tm="100000">
+                                          <p:val>
+                                            <p:strVal val="#ppt_y"/>
+                                          </p:val>
+                                        </p:tav>
+                                      </p:tavLst>
+                                    </p:anim>
+                                  </p:childTnLst>
+                                </p:cTn>
+                              </p:par>
+                            </p:childTnLst>
+                          </p:cTn>
+                        </p:par>
+                      </p:childTnLst>
+                    </p:cTn>
+                  </p:par>
+                </p:childTnLst>
+              </p:cTn>
+              <p:prevCondLst>
+                <p:cond evt="onPrev" delay="0">
+                  <p:tgtEl>
+                    <p:sldTgt/>
+                  </p:tgtEl>
+                </p:cond>
+              </p:prevCondLst>
+              <p:nextCondLst>
+                <p:cond evt="onNext" delay="0">
+                  <p:tgtEl>
+                    <p:sldTgt/>
+                  </p:tgtEl>
+                </p:cond>
+              </p:nextCondLst>
+            </p:seq>
+          </p:childTnLst>
+        </p:cTn>
       </p:par>
     </p:tnLst>
   </p:timing>
@@ -6234,37 +6983,14 @@
       </p:grpSpPr>
       <p:sp>
         <p:nvSpPr>
-          <p:cNvPr id="2" name="Title 1"/>
-          <p:cNvSpPr>
-            <a:spLocks noGrp="1"/>
-          </p:cNvSpPr>
-          <p:nvPr>
-            <p:ph type="title"/>
-          </p:nvPr>
-        </p:nvSpPr>
-        <p:spPr/>
-        <p:txBody>
-          <a:bodyPr/>
-          <a:lstStyle/>
-          <a:p>
-            <a:r>
-              <a:rPr lang="en-US" sz="3200" dirty="0" smtClean="0"/>
-              <a:t>Blank Slide(s) for your presentation on Topic 1</a:t>
-            </a:r>
-            <a:endParaRPr lang="en-US" sz="3200" dirty="0"/>
-          </a:p>
-        </p:txBody>
-      </p:sp>
-      <p:sp>
-        <p:nvSpPr>
           <p:cNvPr id="3" name="TextBox 2"/>
           <p:cNvSpPr txBox="1"/>
           <p:nvPr/>
         </p:nvSpPr>
         <p:spPr>
           <a:xfrm>
-            <a:off x="593725" y="481198"/>
-            <a:ext cx="7809681" cy="839257"/>
+            <a:off x="485775" y="382587"/>
+            <a:ext cx="2878844" cy="916201"/>
           </a:xfrm>
           <a:prstGeom prst="rect">
             <a:avLst/>
@@ -6278,81 +7004,155 @@
           <a:lstStyle/>
           <a:p>
             <a:r>
-              <a:rPr lang="en-US" sz="4600" kern="0" dirty="0" smtClean="0">
-                <a:solidFill>
-                  <a:srgbClr val="FFFFFF"/>
-                </a:solidFill>
-                <a:latin typeface="Calibri" pitchFamily="34" charset="0"/>
-                <a:cs typeface="Calibri" pitchFamily="34" charset="0"/>
-                <a:sym typeface="Arial" pitchFamily="34" charset="0"/>
+              <a:rPr lang="zh-CN" altLang="en-US" sz="5100" dirty="0" smtClean="0">
+                <a:latin typeface="黑体" pitchFamily="49" charset="-122"/>
+                <a:ea typeface="黑体" pitchFamily="49" charset="-122"/>
               </a:rPr>
-              <a:t>AEC AE Summit </a:t>
-            </a:r>
-            <a:r>
-              <a:rPr lang="en-US" sz="4600" kern="0" dirty="0">
-                <a:solidFill>
-                  <a:srgbClr val="FFFFFF"/>
-                </a:solidFill>
-                <a:latin typeface="Calibri" pitchFamily="34" charset="0"/>
-                <a:cs typeface="Calibri" pitchFamily="34" charset="0"/>
-                <a:sym typeface="Arial" pitchFamily="34" charset="0"/>
-              </a:rPr>
-              <a:t>| </a:t>
-            </a:r>
-            <a:r>
-              <a:rPr lang="en-US" sz="4600" dirty="0" smtClean="0">
-                <a:solidFill>
-                  <a:srgbClr val="FFAA00"/>
-                </a:solidFill>
-                <a:cs typeface="Calibri" pitchFamily="34" charset="0"/>
-                <a:sym typeface="Arial" pitchFamily="34" charset="0"/>
-              </a:rPr>
-              <a:t>Presentation</a:t>
-            </a:r>
-            <a:endParaRPr lang="en-US" sz="4600" dirty="0"/>
+              <a:t>鱼眼视图</a:t>
+            </a:r>
+            <a:endParaRPr lang="en-US" sz="5100" dirty="0">
+              <a:latin typeface="黑体" pitchFamily="49" charset="-122"/>
+              <a:ea typeface="黑体" pitchFamily="49" charset="-122"/>
+            </a:endParaRPr>
           </a:p>
         </p:txBody>
       </p:sp>
-      <p:sp>
-        <p:nvSpPr>
-          <p:cNvPr id="4" name="TextBox 3"/>
-          <p:cNvSpPr txBox="1"/>
+      <p:pic>
+        <p:nvPicPr>
+          <p:cNvPr id="1030" name="Picture 6" descr="http://www.photoble.com/wp-content/uploads/2010/04/Fisheye-View-From-Empire-State.jpg"/>
+          <p:cNvPicPr>
+            <a:picLocks noChangeAspect="1" noChangeArrowheads="1"/>
+          </p:cNvPicPr>
           <p:nvPr/>
-        </p:nvSpPr>
-        <p:spPr>
+        </p:nvPicPr>
+        <p:blipFill>
+          <a:blip r:embed="rId3">
+            <a:extLst>
+              <a:ext uri="{28A0092B-C50C-407E-A947-70E740481C1C}">
+                <a14:useLocalDpi xmlns:a14="http://schemas.microsoft.com/office/drawing/2010/main" val="0"/>
+              </a:ext>
+            </a:extLst>
+          </a:blip>
+          <a:srcRect/>
+          <a:stretch>
+            <a:fillRect/>
+          </a:stretch>
+        </p:blipFill>
+        <p:spPr bwMode="auto">
           <a:xfrm>
-            <a:off x="593726" y="1846176"/>
-            <a:ext cx="5380811" cy="562258"/>
+            <a:off x="1492918" y="1525587"/>
+            <a:ext cx="10134408" cy="6705600"/>
           </a:xfrm>
           <a:prstGeom prst="rect">
             <a:avLst/>
           </a:prstGeom>
           <a:noFill/>
+          <a:extLst>
+            <a:ext uri="{909E8E84-426E-40DD-AFC4-6F175D3DCCD1}">
+              <a14:hiddenFill xmlns:a14="http://schemas.microsoft.com/office/drawing/2010/main">
+                <a:solidFill>
+                  <a:srgbClr val="FFFFFF"/>
+                </a:solidFill>
+              </a14:hiddenFill>
+            </a:ext>
+          </a:extLst>
         </p:spPr>
-        <p:txBody>
-          <a:bodyPr wrap="none" lIns="130101" tIns="65050" rIns="130101" bIns="65050" rtlCol="0">
-            <a:spAutoFit/>
-          </a:bodyPr>
-          <a:lstStyle/>
-          <a:p>
-            <a:r>
-              <a:rPr lang="en-US" sz="2800" dirty="0" smtClean="0">
+      </p:pic>
+      <p:pic>
+        <p:nvPicPr>
+          <p:cNvPr id="1028" name="Picture 4" descr="http://eagereyes.org/media/2008/fisheye-calendar.png"/>
+          <p:cNvPicPr>
+            <a:picLocks noChangeAspect="1" noChangeArrowheads="1"/>
+          </p:cNvPicPr>
+          <p:nvPr/>
+        </p:nvPicPr>
+        <p:blipFill>
+          <a:blip r:embed="rId4">
+            <a:extLst>
+              <a:ext uri="{28A0092B-C50C-407E-A947-70E740481C1C}">
+                <a14:useLocalDpi xmlns:a14="http://schemas.microsoft.com/office/drawing/2010/main" val="0"/>
+              </a:ext>
+            </a:extLst>
+          </a:blip>
+          <a:srcRect/>
+          <a:stretch>
+            <a:fillRect/>
+          </a:stretch>
+        </p:blipFill>
+        <p:spPr bwMode="auto">
+          <a:xfrm>
+            <a:off x="2362944" y="1852559"/>
+            <a:ext cx="8395358" cy="6051655"/>
+          </a:xfrm>
+          <a:prstGeom prst="rect">
+            <a:avLst/>
+          </a:prstGeom>
+          <a:noFill/>
+          <a:extLst>
+            <a:ext uri="{909E8E84-426E-40DD-AFC4-6F175D3DCCD1}">
+              <a14:hiddenFill xmlns:a14="http://schemas.microsoft.com/office/drawing/2010/main">
                 <a:solidFill>
-                  <a:srgbClr val="FFAA00"/>
+                  <a:srgbClr val="FFFFFF"/>
                 </a:solidFill>
-                <a:cs typeface="Calibri" pitchFamily="34" charset="0"/>
-              </a:rPr>
-              <a:t>Title of your Presentation Topic1</a:t>
-            </a:r>
-            <a:endParaRPr lang="en-US" sz="2800" dirty="0">
-              <a:solidFill>
-                <a:srgbClr val="FFAA00"/>
-              </a:solidFill>
-              <a:cs typeface="Calibri" pitchFamily="34" charset="0"/>
-            </a:endParaRPr>
-          </a:p>
-        </p:txBody>
-      </p:sp>
+              </a14:hiddenFill>
+            </a:ext>
+          </a:extLst>
+        </p:spPr>
+      </p:pic>
+      <p:pic>
+        <p:nvPicPr>
+          <p:cNvPr id="1026" name="Picture 2" descr="http://www.computer8.info/wp-content/uploads/2012/03/Apple-Getting-Right-To-Dock.jpg"/>
+          <p:cNvPicPr>
+            <a:picLocks noChangeAspect="1" noChangeArrowheads="1"/>
+          </p:cNvPicPr>
+          <p:nvPr/>
+        </p:nvPicPr>
+        <p:blipFill>
+          <a:blip r:embed="rId5" r:link="rId6">
+            <a:extLst>
+              <a:ext uri="{28A0092B-C50C-407E-A947-70E740481C1C}">
+                <a14:useLocalDpi xmlns:a14="http://schemas.microsoft.com/office/drawing/2010/main" val="0"/>
+              </a:ext>
+            </a:extLst>
+          </a:blip>
+          <a:srcRect/>
+          <a:stretch>
+            <a:fillRect/>
+          </a:stretch>
+        </p:blipFill>
+        <p:spPr bwMode="auto">
+          <a:xfrm>
+            <a:off x="2351414" y="2058987"/>
+            <a:ext cx="8373419" cy="5235628"/>
+          </a:xfrm>
+          <a:prstGeom prst="rect">
+            <a:avLst/>
+          </a:prstGeom>
+          <a:noFill/>
+          <a:ln>
+            <a:noFill/>
+          </a:ln>
+          <a:extLst>
+            <a:ext uri="{909E8E84-426E-40DD-AFC4-6F175D3DCCD1}">
+              <a14:hiddenFill xmlns:a14="http://schemas.microsoft.com/office/drawing/2010/main">
+                <a:solidFill>
+                  <a:srgbClr val="FFFFFF"/>
+                </a:solidFill>
+              </a14:hiddenFill>
+            </a:ext>
+            <a:ext uri="{91240B29-F687-4F45-9708-019B960494DF}">
+              <a14:hiddenLine xmlns:a14="http://schemas.microsoft.com/office/drawing/2010/main" w="9525">
+                <a:solidFill>
+                  <a:srgbClr val="000000"/>
+                </a:solidFill>
+                <a:miter lim="800000"/>
+                <a:headEnd/>
+                <a:tailEnd/>
+              </a14:hiddenLine>
+            </a:ext>
+          </a:extLst>
+        </p:spPr>
+      </p:pic>
     </p:spTree>
     <p:extLst>
       <p:ext uri="{BB962C8B-B14F-4D97-AF65-F5344CB8AC3E}">
@@ -6367,7 +7167,242 @@
   <p:timing>
     <p:tnLst>
       <p:par>
-        <p:cTn id="1" dur="indefinite" restart="never" nodeType="tmRoot"/>
+        <p:cTn id="1" dur="indefinite" restart="never" nodeType="tmRoot">
+          <p:childTnLst>
+            <p:seq concurrent="1" nextAc="seek">
+              <p:cTn id="2" dur="indefinite" nodeType="mainSeq">
+                <p:childTnLst>
+                  <p:par>
+                    <p:cTn id="3" fill="hold">
+                      <p:stCondLst>
+                        <p:cond delay="indefinite"/>
+                      </p:stCondLst>
+                      <p:childTnLst>
+                        <p:par>
+                          <p:cTn id="4" fill="hold">
+                            <p:stCondLst>
+                              <p:cond delay="0"/>
+                            </p:stCondLst>
+                            <p:childTnLst>
+                              <p:par>
+                                <p:cTn id="5" presetID="10" presetClass="exit" presetSubtype="0" fill="hold" nodeType="clickEffect">
+                                  <p:stCondLst>
+                                    <p:cond delay="0"/>
+                                  </p:stCondLst>
+                                  <p:childTnLst>
+                                    <p:animEffect transition="out" filter="fade">
+                                      <p:cBhvr>
+                                        <p:cTn id="6" dur="500"/>
+                                        <p:tgtEl>
+                                          <p:spTgt spid="1030"/>
+                                        </p:tgtEl>
+                                      </p:cBhvr>
+                                    </p:animEffect>
+                                    <p:set>
+                                      <p:cBhvr>
+                                        <p:cTn id="7" dur="1" fill="hold">
+                                          <p:stCondLst>
+                                            <p:cond delay="499"/>
+                                          </p:stCondLst>
+                                        </p:cTn>
+                                        <p:tgtEl>
+                                          <p:spTgt spid="1030"/>
+                                        </p:tgtEl>
+                                        <p:attrNameLst>
+                                          <p:attrName>style.visibility</p:attrName>
+                                        </p:attrNameLst>
+                                      </p:cBhvr>
+                                      <p:to>
+                                        <p:strVal val="hidden"/>
+                                      </p:to>
+                                    </p:set>
+                                  </p:childTnLst>
+                                </p:cTn>
+                              </p:par>
+                            </p:childTnLst>
+                          </p:cTn>
+                        </p:par>
+                      </p:childTnLst>
+                    </p:cTn>
+                  </p:par>
+                  <p:par>
+                    <p:cTn id="8" fill="hold">
+                      <p:stCondLst>
+                        <p:cond delay="indefinite"/>
+                      </p:stCondLst>
+                      <p:childTnLst>
+                        <p:par>
+                          <p:cTn id="9" fill="hold">
+                            <p:stCondLst>
+                              <p:cond delay="0"/>
+                            </p:stCondLst>
+                            <p:childTnLst>
+                              <p:par>
+                                <p:cTn id="10" presetID="10" presetClass="entr" presetSubtype="0" fill="hold" nodeType="clickEffect">
+                                  <p:stCondLst>
+                                    <p:cond delay="0"/>
+                                  </p:stCondLst>
+                                  <p:childTnLst>
+                                    <p:set>
+                                      <p:cBhvr>
+                                        <p:cTn id="11" dur="1" fill="hold">
+                                          <p:stCondLst>
+                                            <p:cond delay="0"/>
+                                          </p:stCondLst>
+                                        </p:cTn>
+                                        <p:tgtEl>
+                                          <p:spTgt spid="1028"/>
+                                        </p:tgtEl>
+                                        <p:attrNameLst>
+                                          <p:attrName>style.visibility</p:attrName>
+                                        </p:attrNameLst>
+                                      </p:cBhvr>
+                                      <p:to>
+                                        <p:strVal val="visible"/>
+                                      </p:to>
+                                    </p:set>
+                                    <p:animEffect transition="in" filter="fade">
+                                      <p:cBhvr>
+                                        <p:cTn id="12" dur="500"/>
+                                        <p:tgtEl>
+                                          <p:spTgt spid="1028"/>
+                                        </p:tgtEl>
+                                      </p:cBhvr>
+                                    </p:animEffect>
+                                  </p:childTnLst>
+                                </p:cTn>
+                              </p:par>
+                            </p:childTnLst>
+                          </p:cTn>
+                        </p:par>
+                      </p:childTnLst>
+                    </p:cTn>
+                  </p:par>
+                  <p:par>
+                    <p:cTn id="13" fill="hold">
+                      <p:stCondLst>
+                        <p:cond delay="indefinite"/>
+                      </p:stCondLst>
+                      <p:childTnLst>
+                        <p:par>
+                          <p:cTn id="14" fill="hold">
+                            <p:stCondLst>
+                              <p:cond delay="0"/>
+                            </p:stCondLst>
+                            <p:childTnLst>
+                              <p:par>
+                                <p:cTn id="15" presetID="10" presetClass="exit" presetSubtype="0" fill="hold" nodeType="clickEffect">
+                                  <p:stCondLst>
+                                    <p:cond delay="0"/>
+                                  </p:stCondLst>
+                                  <p:childTnLst>
+                                    <p:animEffect transition="out" filter="fade">
+                                      <p:cBhvr>
+                                        <p:cTn id="16" dur="500"/>
+                                        <p:tgtEl>
+                                          <p:spTgt spid="1028"/>
+                                        </p:tgtEl>
+                                      </p:cBhvr>
+                                    </p:animEffect>
+                                    <p:set>
+                                      <p:cBhvr>
+                                        <p:cTn id="17" dur="1" fill="hold">
+                                          <p:stCondLst>
+                                            <p:cond delay="499"/>
+                                          </p:stCondLst>
+                                        </p:cTn>
+                                        <p:tgtEl>
+                                          <p:spTgt spid="1028"/>
+                                        </p:tgtEl>
+                                        <p:attrNameLst>
+                                          <p:attrName>style.visibility</p:attrName>
+                                        </p:attrNameLst>
+                                      </p:cBhvr>
+                                      <p:to>
+                                        <p:strVal val="hidden"/>
+                                      </p:to>
+                                    </p:set>
+                                  </p:childTnLst>
+                                </p:cTn>
+                              </p:par>
+                            </p:childTnLst>
+                          </p:cTn>
+                        </p:par>
+                      </p:childTnLst>
+                    </p:cTn>
+                  </p:par>
+                  <p:par>
+                    <p:cTn id="18" fill="hold">
+                      <p:stCondLst>
+                        <p:cond delay="indefinite"/>
+                      </p:stCondLst>
+                      <p:childTnLst>
+                        <p:par>
+                          <p:cTn id="19" fill="hold">
+                            <p:stCondLst>
+                              <p:cond delay="0"/>
+                            </p:stCondLst>
+                            <p:childTnLst>
+                              <p:par>
+                                <p:cTn id="20" presetID="10" presetClass="entr" presetSubtype="0" fill="hold" nodeType="clickEffect">
+                                  <p:stCondLst>
+                                    <p:cond delay="0"/>
+                                  </p:stCondLst>
+                                  <p:childTnLst>
+                                    <p:set>
+                                      <p:cBhvr>
+                                        <p:cTn id="21" dur="1" fill="hold">
+                                          <p:stCondLst>
+                                            <p:cond delay="0"/>
+                                          </p:stCondLst>
+                                        </p:cTn>
+                                        <p:tgtEl>
+                                          <p:spTgt spid="1026"/>
+                                        </p:tgtEl>
+                                        <p:attrNameLst>
+                                          <p:attrName>style.visibility</p:attrName>
+                                        </p:attrNameLst>
+                                      </p:cBhvr>
+                                      <p:to>
+                                        <p:strVal val="visible"/>
+                                      </p:to>
+                                    </p:set>
+                                    <p:animEffect transition="in" filter="fade">
+                                      <p:cBhvr>
+                                        <p:cTn id="22" dur="500"/>
+                                        <p:tgtEl>
+                                          <p:spTgt spid="1026"/>
+                                        </p:tgtEl>
+                                      </p:cBhvr>
+                                    </p:animEffect>
+                                  </p:childTnLst>
+                                </p:cTn>
+                              </p:par>
+                            </p:childTnLst>
+                          </p:cTn>
+                        </p:par>
+                      </p:childTnLst>
+                    </p:cTn>
+                  </p:par>
+                </p:childTnLst>
+              </p:cTn>
+              <p:prevCondLst>
+                <p:cond evt="onPrev" delay="0">
+                  <p:tgtEl>
+                    <p:sldTgt/>
+                  </p:tgtEl>
+                </p:cond>
+              </p:prevCondLst>
+              <p:nextCondLst>
+                <p:cond evt="onNext" delay="0">
+                  <p:tgtEl>
+                    <p:sldTgt/>
+                  </p:tgtEl>
+                </p:cond>
+              </p:nextCondLst>
+            </p:seq>
+          </p:childTnLst>
+        </p:cTn>
       </p:par>
     </p:tnLst>
   </p:timing>
@@ -6393,42 +7428,14 @@
       </p:grpSpPr>
       <p:sp>
         <p:nvSpPr>
-          <p:cNvPr id="2" name="Title 1"/>
-          <p:cNvSpPr>
-            <a:spLocks noGrp="1"/>
-          </p:cNvSpPr>
-          <p:nvPr>
-            <p:ph type="title"/>
-          </p:nvPr>
-        </p:nvSpPr>
-        <p:spPr>
-          <a:xfrm>
-            <a:off x="593725" y="4573587"/>
-            <a:ext cx="11762080" cy="3962400"/>
-          </a:xfrm>
-        </p:spPr>
-        <p:txBody>
-          <a:bodyPr/>
-          <a:lstStyle/>
-          <a:p>
-            <a:r>
-              <a:rPr lang="en-US" sz="3200" dirty="0" smtClean="0"/>
-              <a:t>&lt;Insert an image from your demonstration here&gt;</a:t>
-            </a:r>
-            <a:endParaRPr lang="en-US" sz="3200" dirty="0"/>
-          </a:p>
-        </p:txBody>
-      </p:sp>
-      <p:sp>
-        <p:nvSpPr>
           <p:cNvPr id="3" name="TextBox 2"/>
           <p:cNvSpPr txBox="1"/>
           <p:nvPr/>
         </p:nvSpPr>
         <p:spPr>
           <a:xfrm>
-            <a:off x="593725" y="481198"/>
-            <a:ext cx="8335466" cy="839257"/>
+            <a:off x="485775" y="382587"/>
+            <a:ext cx="6802995" cy="916201"/>
           </a:xfrm>
           <a:prstGeom prst="rect">
             <a:avLst/>
@@ -6442,138 +7449,343 @@
           <a:lstStyle/>
           <a:p>
             <a:r>
-              <a:rPr lang="en-US" sz="4600" kern="0" dirty="0" smtClean="0">
+              <a:rPr lang="zh-CN" altLang="en-US" sz="5100" dirty="0" smtClean="0">
                 <a:solidFill>
                   <a:srgbClr val="FFFFFF"/>
                 </a:solidFill>
-                <a:latin typeface="Calibri" pitchFamily="34" charset="0"/>
-                <a:cs typeface="Calibri" pitchFamily="34" charset="0"/>
-                <a:sym typeface="Arial" pitchFamily="34" charset="0"/>
+                <a:latin typeface="黑体" pitchFamily="49" charset="-122"/>
+                <a:ea typeface="黑体" pitchFamily="49" charset="-122"/>
               </a:rPr>
-              <a:t>AEC AE Summit </a:t>
-            </a:r>
-            <a:r>
-              <a:rPr lang="en-US" sz="4600" kern="0" dirty="0">
+              <a:t>鱼眼视</a:t>
+            </a:r>
+            <a:r>
+              <a:rPr lang="zh-CN" altLang="en-US" sz="5100" dirty="0" smtClean="0">
                 <a:solidFill>
                   <a:srgbClr val="FFFFFF"/>
                 </a:solidFill>
-                <a:latin typeface="Calibri" pitchFamily="34" charset="0"/>
-                <a:cs typeface="Calibri" pitchFamily="34" charset="0"/>
-                <a:sym typeface="Arial" pitchFamily="34" charset="0"/>
+                <a:latin typeface="黑体" pitchFamily="49" charset="-122"/>
+                <a:ea typeface="黑体" pitchFamily="49" charset="-122"/>
               </a:rPr>
-              <a:t>| </a:t>
-            </a:r>
-            <a:r>
-              <a:rPr lang="en-US" sz="4600" dirty="0" smtClean="0">
-                <a:solidFill>
-                  <a:srgbClr val="FFAA00"/>
-                </a:solidFill>
-                <a:cs typeface="Calibri" pitchFamily="34" charset="0"/>
-                <a:sym typeface="Arial" pitchFamily="34" charset="0"/>
-              </a:rPr>
-              <a:t>Demonstration</a:t>
-            </a:r>
-            <a:endParaRPr lang="en-US" sz="4600" dirty="0"/>
+              <a:t>图和源代码展示</a:t>
+            </a:r>
+            <a:endParaRPr lang="en-US" sz="5100" dirty="0">
+              <a:solidFill>
+                <a:srgbClr val="FFFFFF"/>
+              </a:solidFill>
+              <a:latin typeface="黑体" pitchFamily="49" charset="-122"/>
+              <a:ea typeface="黑体" pitchFamily="49" charset="-122"/>
+            </a:endParaRPr>
           </a:p>
         </p:txBody>
       </p:sp>
       <p:sp>
         <p:nvSpPr>
-          <p:cNvPr id="4" name="TextBox 3"/>
-          <p:cNvSpPr txBox="1"/>
+          <p:cNvPr id="7" name="Rectangle 3"/>
+          <p:cNvSpPr txBox="1">
+            <a:spLocks noChangeArrowheads="1"/>
+          </p:cNvSpPr>
           <p:nvPr/>
         </p:nvSpPr>
         <p:spPr>
           <a:xfrm>
-            <a:off x="593726" y="1846176"/>
-            <a:ext cx="4067759" cy="562258"/>
-          </a:xfrm>
-          <a:prstGeom prst="rect">
-            <a:avLst/>
-          </a:prstGeom>
-          <a:noFill/>
-        </p:spPr>
-        <p:txBody>
-          <a:bodyPr wrap="none" lIns="130101" tIns="65050" rIns="130101" bIns="65050" rtlCol="0">
-            <a:spAutoFit/>
-          </a:bodyPr>
-          <a:lstStyle/>
-          <a:p>
-            <a:r>
-              <a:rPr lang="en-US" sz="2800" dirty="0" smtClean="0">
-                <a:solidFill>
-                  <a:srgbClr val="FFAA00"/>
-                </a:solidFill>
-                <a:cs typeface="Calibri" pitchFamily="34" charset="0"/>
-              </a:rPr>
-              <a:t>Title of Demonstration 1</a:t>
-            </a:r>
-          </a:p>
-        </p:txBody>
-      </p:sp>
-      <p:sp>
-        <p:nvSpPr>
-          <p:cNvPr id="5" name="Rectangle 4"/>
-          <p:cNvSpPr/>
-          <p:nvPr/>
-        </p:nvSpPr>
-        <p:spPr>
-          <a:xfrm>
-            <a:off x="1171575" y="2408434"/>
-            <a:ext cx="7364517" cy="1692771"/>
+            <a:off x="561975" y="1830387"/>
+            <a:ext cx="11762080" cy="6699652"/>
           </a:xfrm>
           <a:prstGeom prst="rect">
             <a:avLst/>
           </a:prstGeom>
         </p:spPr>
         <p:txBody>
-          <a:bodyPr wrap="none">
-            <a:spAutoFit/>
+          <a:bodyPr>
+            <a:normAutofit/>
           </a:bodyPr>
-          <a:lstStyle/>
-          <a:p>
+          <a:lstStyle>
+            <a:lvl1pPr marL="284147" indent="-284147" algn="l" rtl="0" eaLnBrk="1" fontAlgn="base" hangingPunct="1">
+              <a:spcBef>
+                <a:spcPts val="499"/>
+              </a:spcBef>
+              <a:spcAft>
+                <a:spcPct val="0"/>
+              </a:spcAft>
+              <a:buClr>
+                <a:srgbClr val="FFFFFF"/>
+              </a:buClr>
+              <a:buSzPct val="80000"/>
+              <a:buFont typeface="Wingdings" pitchFamily="2" charset="2"/>
+              <a:buChar char="§"/>
+              <a:defRPr sz="3200">
+                <a:solidFill>
+                  <a:srgbClr val="FFFFFF"/>
+                </a:solidFill>
+                <a:latin typeface="+mn-lt"/>
+                <a:ea typeface="+mn-ea"/>
+                <a:cs typeface="+mn-cs"/>
+                <a:sym typeface="Arial" pitchFamily="34" charset="0"/>
+              </a:defRPr>
+            </a:lvl1pPr>
+            <a:lvl2pPr marL="568293" indent="-284147" algn="l" rtl="0" eaLnBrk="1" fontAlgn="base" hangingPunct="1">
+              <a:spcBef>
+                <a:spcPts val="499"/>
+              </a:spcBef>
+              <a:spcAft>
+                <a:spcPct val="0"/>
+              </a:spcAft>
+              <a:buClr>
+                <a:srgbClr val="FFFFFF"/>
+              </a:buClr>
+              <a:buSzPct val="80000"/>
+              <a:buFont typeface="Wingdings" pitchFamily="2" charset="2"/>
+              <a:buChar char="§"/>
+              <a:defRPr sz="2800">
+                <a:solidFill>
+                  <a:srgbClr val="FFFFFF"/>
+                </a:solidFill>
+                <a:latin typeface="+mn-lt"/>
+                <a:ea typeface="+mn-ea"/>
+                <a:cs typeface="+mn-cs"/>
+                <a:sym typeface="Arial" pitchFamily="34" charset="0"/>
+              </a:defRPr>
+            </a:lvl2pPr>
+            <a:lvl3pPr marL="909588" indent="-255573" algn="l" rtl="0" eaLnBrk="1" fontAlgn="base" hangingPunct="1">
+              <a:spcBef>
+                <a:spcPts val="400"/>
+              </a:spcBef>
+              <a:spcAft>
+                <a:spcPct val="0"/>
+              </a:spcAft>
+              <a:buClr>
+                <a:srgbClr val="FFFFFF"/>
+              </a:buClr>
+              <a:buSzPct val="80000"/>
+              <a:buFont typeface="Wingdings" pitchFamily="2" charset="2"/>
+              <a:buChar char="§"/>
+              <a:defRPr sz="2400">
+                <a:solidFill>
+                  <a:srgbClr val="FFFFFF"/>
+                </a:solidFill>
+                <a:latin typeface="+mn-lt"/>
+                <a:ea typeface="+mn-ea"/>
+                <a:cs typeface="+mn-cs"/>
+                <a:sym typeface="Arial" pitchFamily="34" charset="0"/>
+              </a:defRPr>
+            </a:lvl3pPr>
+            <a:lvl4pPr marL="1422321" indent="-228587" algn="l" rtl="0" eaLnBrk="1" fontAlgn="base" hangingPunct="1">
+              <a:spcBef>
+                <a:spcPts val="300"/>
+              </a:spcBef>
+              <a:spcAft>
+                <a:spcPct val="0"/>
+              </a:spcAft>
+              <a:buClr>
+                <a:srgbClr val="FFFFFF"/>
+              </a:buClr>
+              <a:buSzPct val="80000"/>
+              <a:buFont typeface="Wingdings" pitchFamily="2" charset="2"/>
+              <a:buChar char="§"/>
+              <a:defRPr sz="2100">
+                <a:solidFill>
+                  <a:srgbClr val="FFFFFF"/>
+                </a:solidFill>
+                <a:latin typeface="+mn-lt"/>
+                <a:ea typeface="+mn-ea"/>
+                <a:cs typeface="+mn-cs"/>
+                <a:sym typeface="Arial" pitchFamily="34" charset="0"/>
+              </a:defRPr>
+            </a:lvl4pPr>
+            <a:lvl5pPr marL="1877908" indent="-206363" algn="l" rtl="0" eaLnBrk="1" fontAlgn="base" hangingPunct="1">
+              <a:spcBef>
+                <a:spcPts val="300"/>
+              </a:spcBef>
+              <a:spcAft>
+                <a:spcPct val="0"/>
+              </a:spcAft>
+              <a:buClr>
+                <a:srgbClr val="FFFFFF"/>
+              </a:buClr>
+              <a:buSzPct val="80000"/>
+              <a:buFont typeface="Wingdings" pitchFamily="2" charset="2"/>
+              <a:buChar char="§"/>
+              <a:defRPr sz="2000">
+                <a:solidFill>
+                  <a:srgbClr val="FFFFFF"/>
+                </a:solidFill>
+                <a:latin typeface="+mn-lt"/>
+                <a:ea typeface="+mn-ea"/>
+                <a:cs typeface="+mn-cs"/>
+                <a:sym typeface="Arial" pitchFamily="34" charset="0"/>
+              </a:defRPr>
+            </a:lvl5pPr>
+            <a:lvl6pPr marL="2336016" indent="-206447" algn="l" rtl="0" eaLnBrk="1" fontAlgn="base" hangingPunct="1">
+              <a:spcBef>
+                <a:spcPts val="300"/>
+              </a:spcBef>
+              <a:spcAft>
+                <a:spcPct val="0"/>
+              </a:spcAft>
+              <a:buClr>
+                <a:srgbClr val="FFFFFF"/>
+              </a:buClr>
+              <a:buSzPct val="80000"/>
+              <a:buFont typeface="Lucida Grande" charset="0"/>
+              <a:buChar char="§"/>
+              <a:defRPr sz="2000">
+                <a:solidFill>
+                  <a:srgbClr val="FFFFFF"/>
+                </a:solidFill>
+                <a:latin typeface="+mn-lt"/>
+                <a:ea typeface="+mn-ea"/>
+                <a:cs typeface="+mn-cs"/>
+                <a:sym typeface="Arial" charset="0"/>
+              </a:defRPr>
+            </a:lvl6pPr>
+            <a:lvl7pPr marL="2793373" indent="-206447" algn="l" rtl="0" eaLnBrk="1" fontAlgn="base" hangingPunct="1">
+              <a:spcBef>
+                <a:spcPts val="300"/>
+              </a:spcBef>
+              <a:spcAft>
+                <a:spcPct val="0"/>
+              </a:spcAft>
+              <a:buClr>
+                <a:srgbClr val="FFFFFF"/>
+              </a:buClr>
+              <a:buSzPct val="80000"/>
+              <a:buFont typeface="Lucida Grande" charset="0"/>
+              <a:buChar char="§"/>
+              <a:defRPr sz="2000">
+                <a:solidFill>
+                  <a:srgbClr val="FFFFFF"/>
+                </a:solidFill>
+                <a:latin typeface="+mn-lt"/>
+                <a:ea typeface="+mn-ea"/>
+                <a:cs typeface="+mn-cs"/>
+                <a:sym typeface="Arial" charset="0"/>
+              </a:defRPr>
+            </a:lvl7pPr>
+            <a:lvl8pPr marL="3250731" indent="-206447" algn="l" rtl="0" eaLnBrk="1" fontAlgn="base" hangingPunct="1">
+              <a:spcBef>
+                <a:spcPts val="300"/>
+              </a:spcBef>
+              <a:spcAft>
+                <a:spcPct val="0"/>
+              </a:spcAft>
+              <a:buClr>
+                <a:srgbClr val="FFFFFF"/>
+              </a:buClr>
+              <a:buSzPct val="80000"/>
+              <a:buFont typeface="Lucida Grande" charset="0"/>
+              <a:buChar char="§"/>
+              <a:defRPr sz="2000">
+                <a:solidFill>
+                  <a:srgbClr val="FFFFFF"/>
+                </a:solidFill>
+                <a:latin typeface="+mn-lt"/>
+                <a:ea typeface="+mn-ea"/>
+                <a:cs typeface="+mn-cs"/>
+                <a:sym typeface="Arial" charset="0"/>
+              </a:defRPr>
+            </a:lvl8pPr>
+            <a:lvl9pPr marL="3708087" indent="-206447" algn="l" rtl="0" eaLnBrk="1" fontAlgn="base" hangingPunct="1">
+              <a:spcBef>
+                <a:spcPts val="300"/>
+              </a:spcBef>
+              <a:spcAft>
+                <a:spcPct val="0"/>
+              </a:spcAft>
+              <a:buClr>
+                <a:srgbClr val="FFFFFF"/>
+              </a:buClr>
+              <a:buSzPct val="80000"/>
+              <a:buFont typeface="Lucida Grande" charset="0"/>
+              <a:buChar char="§"/>
+              <a:defRPr sz="2000">
+                <a:solidFill>
+                  <a:srgbClr val="FFFFFF"/>
+                </a:solidFill>
+                <a:latin typeface="+mn-lt"/>
+                <a:ea typeface="+mn-ea"/>
+                <a:cs typeface="+mn-cs"/>
+                <a:sym typeface="Arial" charset="0"/>
+              </a:defRPr>
+            </a:lvl9pPr>
+          </a:lstStyle>
+          <a:p>
+            <a:pPr>
+              <a:spcAft>
+                <a:spcPts val="1800"/>
+              </a:spcAft>
+            </a:pPr>
+            <a:r>
+              <a:rPr lang="en-US" altLang="zh-CN" sz="4100" dirty="0" smtClean="0"/>
+              <a:t>George W</a:t>
+            </a:r>
+            <a:r>
+              <a:rPr lang="en-US" altLang="zh-CN" sz="4100" dirty="0"/>
+              <a:t>.</a:t>
+            </a:r>
+            <a:r>
+              <a:rPr lang="en-US" altLang="zh-CN" sz="4100" dirty="0" smtClean="0"/>
+              <a:t> </a:t>
+            </a:r>
+            <a:r>
+              <a:rPr lang="en-US" altLang="zh-CN" sz="4100" smtClean="0"/>
+              <a:t>Furnas</a:t>
+            </a:r>
+          </a:p>
+          <a:p>
+            <a:pPr>
+              <a:spcAft>
+                <a:spcPts val="1800"/>
+              </a:spcAft>
+            </a:pPr>
+            <a:endParaRPr lang="en-US" altLang="zh-CN" sz="4100" dirty="0" smtClean="0"/>
+          </a:p>
+          <a:p>
+            <a:pPr lvl="1">
+              <a:spcAft>
+                <a:spcPts val="1800"/>
+              </a:spcAft>
+            </a:pPr>
+            <a:endParaRPr lang="en-US" altLang="zh-CN" dirty="0" smtClean="0"/>
+          </a:p>
+          <a:p>
+            <a:pPr lvl="1">
+              <a:spcAft>
+                <a:spcPts val="1800"/>
+              </a:spcAft>
+            </a:pPr>
+            <a:endParaRPr lang="en-US" altLang="zh-CN" dirty="0" smtClean="0"/>
+          </a:p>
+          <a:p>
+            <a:pPr>
+              <a:spcAft>
+                <a:spcPts val="600"/>
+              </a:spcAft>
+            </a:pPr>
+            <a:endParaRPr lang="en-US" dirty="0" smtClean="0"/>
+          </a:p>
+          <a:p>
+            <a:endParaRPr lang="en-US" dirty="0" smtClean="0"/>
+          </a:p>
+          <a:p>
+            <a:endParaRPr lang="en-US" dirty="0" smtClean="0"/>
+          </a:p>
+          <a:p>
+            <a:pPr marL="0" indent="0">
+              <a:buFont typeface="Wingdings" pitchFamily="2" charset="2"/>
+              <a:buNone/>
+            </a:pPr>
             <a:r>
               <a:rPr lang="en-US" dirty="0" smtClean="0"/>
-              <a:t>In this Demonstration we will cover the following:</a:t>
-            </a:r>
-          </a:p>
-          <a:p>
-            <a:pPr marL="514350" indent="-514350">
-              <a:buFont typeface="Arial" pitchFamily="34" charset="0"/>
-              <a:buChar char="•"/>
-            </a:pPr>
-            <a:r>
-              <a:rPr lang="en-US" dirty="0" smtClean="0"/>
-              <a:t>Bullet point</a:t>
-            </a:r>
-          </a:p>
-          <a:p>
-            <a:pPr marL="514350" indent="-514350">
-              <a:buFont typeface="Arial" pitchFamily="34" charset="0"/>
-              <a:buChar char="•"/>
-            </a:pPr>
-            <a:r>
-              <a:rPr lang="en-US" dirty="0" smtClean="0"/>
-              <a:t>Bullet point</a:t>
-            </a:r>
-          </a:p>
-          <a:p>
-            <a:pPr marL="514350" indent="-514350">
-              <a:buFont typeface="Arial" pitchFamily="34" charset="0"/>
-              <a:buChar char="•"/>
-            </a:pPr>
-            <a:r>
-              <a:rPr lang="en-US" dirty="0" smtClean="0"/>
-              <a:t>Bullet point</a:t>
-            </a:r>
-            <a:endParaRPr lang="en-US" dirty="0"/>
+              <a:t>						</a:t>
+            </a:r>
+            <a:endParaRPr lang="en-US" sz="2000" dirty="0" smtClean="0"/>
           </a:p>
         </p:txBody>
       </p:sp>
     </p:spTree>
     <p:extLst>
       <p:ext uri="{BB962C8B-B14F-4D97-AF65-F5344CB8AC3E}">
-        <p14:creationId xmlns:p14="http://schemas.microsoft.com/office/powerpoint/2010/main" val="4283105111"/>
+        <p14:creationId xmlns:p14="http://schemas.microsoft.com/office/powerpoint/2010/main" val="2861879171"/>
       </p:ext>
     </p:extLst>
   </p:cSld>
@@ -6630,15 +7842,7 @@
           <a:p>
             <a:r>
               <a:rPr lang="en-US" sz="3200" dirty="0" smtClean="0"/>
-              <a:t>&lt;Insert an image from the completed </a:t>
-            </a:r>
-            <a:r>
-              <a:rPr lang="en-US" sz="3200" dirty="0"/>
-              <a:t>e</a:t>
-            </a:r>
-            <a:r>
-              <a:rPr lang="en-US" sz="3200" dirty="0" smtClean="0"/>
-              <a:t>xercise here&gt;</a:t>
+              <a:t>&lt;Insert an image from your demonstration here&gt;</a:t>
             </a:r>
             <a:endParaRPr lang="en-US" sz="3200" dirty="0"/>
           </a:p>
@@ -6653,7 +7857,7 @@
         <p:spPr>
           <a:xfrm>
             <a:off x="593725" y="481198"/>
-            <a:ext cx="6758111" cy="839257"/>
+            <a:ext cx="8335466" cy="839257"/>
           </a:xfrm>
           <a:prstGeom prst="rect">
             <a:avLst/>
@@ -6696,7 +7900,7 @@
                 <a:cs typeface="Calibri" pitchFamily="34" charset="0"/>
                 <a:sym typeface="Arial" pitchFamily="34" charset="0"/>
               </a:rPr>
-              <a:t>Exercise</a:t>
+              <a:t>Demonstration</a:t>
             </a:r>
             <a:endParaRPr lang="en-US" sz="4600" dirty="0"/>
           </a:p>
@@ -6711,7 +7915,7 @@
         <p:spPr>
           <a:xfrm>
             <a:off x="593726" y="1846176"/>
-            <a:ext cx="3105957" cy="562258"/>
+            <a:ext cx="4067759" cy="562258"/>
           </a:xfrm>
           <a:prstGeom prst="rect">
             <a:avLst/>
@@ -6731,7 +7935,7 @@
                 </a:solidFill>
                 <a:cs typeface="Calibri" pitchFamily="34" charset="0"/>
               </a:rPr>
-              <a:t>Title of Exercise 1</a:t>
+              <a:t>Title of Demonstration 1</a:t>
             </a:r>
           </a:p>
         </p:txBody>
@@ -6745,7 +7949,7 @@
         <p:spPr>
           <a:xfrm>
             <a:off x="1171575" y="2408434"/>
-            <a:ext cx="7104830" cy="1692771"/>
+            <a:ext cx="7364517" cy="1692771"/>
           </a:xfrm>
           <a:prstGeom prst="rect">
             <a:avLst/>
@@ -6759,7 +7963,7 @@
           <a:p>
             <a:r>
               <a:rPr lang="en-US" dirty="0" smtClean="0"/>
-              <a:t>In this Exercise you will perform the following:</a:t>
+              <a:t>In this Demonstration we will cover the following:</a:t>
             </a:r>
           </a:p>
           <a:p>
@@ -6798,7 +8002,7 @@
     </p:spTree>
     <p:extLst>
       <p:ext uri="{BB962C8B-B14F-4D97-AF65-F5344CB8AC3E}">
-        <p14:creationId xmlns:p14="http://schemas.microsoft.com/office/powerpoint/2010/main" val="2201155064"/>
+        <p14:creationId xmlns:p14="http://schemas.microsoft.com/office/powerpoint/2010/main" val="4283105111"/>
       </p:ext>
     </p:extLst>
   </p:cSld>
@@ -6835,6 +8039,42 @@
       </p:grpSpPr>
       <p:sp>
         <p:nvSpPr>
+          <p:cNvPr id="2" name="Title 1"/>
+          <p:cNvSpPr>
+            <a:spLocks noGrp="1"/>
+          </p:cNvSpPr>
+          <p:nvPr>
+            <p:ph type="title"/>
+          </p:nvPr>
+        </p:nvSpPr>
+        <p:spPr>
+          <a:xfrm>
+            <a:off x="593725" y="4573587"/>
+            <a:ext cx="11762080" cy="3962400"/>
+          </a:xfrm>
+        </p:spPr>
+        <p:txBody>
+          <a:bodyPr/>
+          <a:lstStyle/>
+          <a:p>
+            <a:r>
+              <a:rPr lang="en-US" sz="3200" dirty="0" smtClean="0"/>
+              <a:t>&lt;Insert an image from the completed </a:t>
+            </a:r>
+            <a:r>
+              <a:rPr lang="en-US" sz="3200" dirty="0"/>
+              <a:t>e</a:t>
+            </a:r>
+            <a:r>
+              <a:rPr lang="en-US" sz="3200" dirty="0" smtClean="0"/>
+              <a:t>xercise here&gt;</a:t>
+            </a:r>
+            <a:endParaRPr lang="en-US" sz="3200" dirty="0"/>
+          </a:p>
+        </p:txBody>
+      </p:sp>
+      <p:sp>
+        <p:nvSpPr>
           <p:cNvPr id="3" name="TextBox 2"/>
           <p:cNvSpPr txBox="1"/>
           <p:nvPr/>
@@ -6842,7 +8082,7 @@
         <p:spPr>
           <a:xfrm>
             <a:off x="593725" y="481198"/>
-            <a:ext cx="7021003" cy="839257"/>
+            <a:ext cx="6758111" cy="839257"/>
           </a:xfrm>
           <a:prstGeom prst="rect">
             <a:avLst/>
@@ -6885,7 +8125,7 @@
                 <a:cs typeface="Calibri" pitchFamily="34" charset="0"/>
                 <a:sym typeface="Arial" pitchFamily="34" charset="0"/>
               </a:rPr>
-              <a:t>Summary</a:t>
+              <a:t>Exercise</a:t>
             </a:r>
             <a:endParaRPr lang="en-US" sz="4600" dirty="0"/>
           </a:p>
@@ -6900,7 +8140,7 @@
         <p:spPr>
           <a:xfrm>
             <a:off x="593726" y="1846176"/>
-            <a:ext cx="2101388" cy="562258"/>
+            <a:ext cx="3105957" cy="562258"/>
           </a:xfrm>
           <a:prstGeom prst="rect">
             <a:avLst/>
@@ -6920,7 +8160,7 @@
                 </a:solidFill>
                 <a:cs typeface="Calibri" pitchFamily="34" charset="0"/>
               </a:rPr>
-              <a:t>Summary 1</a:t>
+              <a:t>Title of Exercise 1</a:t>
             </a:r>
           </a:p>
         </p:txBody>
@@ -6934,7 +8174,7 @@
         <p:spPr>
           <a:xfrm>
             <a:off x="1171575" y="2408434"/>
-            <a:ext cx="7570534" cy="3293209"/>
+            <a:ext cx="7104830" cy="1692771"/>
           </a:xfrm>
           <a:prstGeom prst="rect">
             <a:avLst/>
@@ -6946,7 +8186,10 @@
           </a:bodyPr>
           <a:lstStyle/>
           <a:p>
-            <a:endParaRPr lang="en-US" dirty="0" smtClean="0"/>
+            <a:r>
+              <a:rPr lang="en-US" dirty="0" smtClean="0"/>
+              <a:t>In this Exercise you will perform the following:</a:t>
+            </a:r>
           </a:p>
           <a:p>
             <a:pPr marL="514350" indent="-514350">
@@ -6955,7 +8198,7 @@
             </a:pPr>
             <a:r>
               <a:rPr lang="en-US" dirty="0" smtClean="0"/>
-              <a:t>Target Audience (address as possible)</a:t>
+              <a:t>Bullet point</a:t>
             </a:r>
           </a:p>
           <a:p>
@@ -6965,15 +8208,7 @@
             </a:pPr>
             <a:r>
               <a:rPr lang="en-US" dirty="0" smtClean="0"/>
-              <a:t>Opportunity (</a:t>
-            </a:r>
-            <a:r>
-              <a:rPr lang="en-US" dirty="0"/>
-              <a:t>address as possible</a:t>
-            </a:r>
-            <a:r>
-              <a:rPr lang="en-US" dirty="0" smtClean="0"/>
-              <a:t>)</a:t>
+              <a:t>Bullet point</a:t>
             </a:r>
           </a:p>
           <a:p>
@@ -6983,61 +8218,8 @@
             </a:pPr>
             <a:r>
               <a:rPr lang="en-US" dirty="0" smtClean="0"/>
-              <a:t>Benefits (</a:t>
-            </a:r>
-            <a:r>
-              <a:rPr lang="en-US" dirty="0"/>
-              <a:t>address as possible</a:t>
-            </a:r>
-            <a:r>
-              <a:rPr lang="en-US" dirty="0" smtClean="0"/>
-              <a:t>)</a:t>
-            </a:r>
-          </a:p>
-          <a:p>
-            <a:pPr marL="514350" indent="-514350">
-              <a:buFont typeface="Arial" pitchFamily="34" charset="0"/>
-              <a:buChar char="•"/>
-            </a:pPr>
-            <a:r>
-              <a:rPr lang="en-US" dirty="0" smtClean="0"/>
-              <a:t>Competitive Advantages (</a:t>
-            </a:r>
-            <a:r>
-              <a:rPr lang="en-US" dirty="0"/>
-              <a:t>address as possible</a:t>
-            </a:r>
-            <a:r>
-              <a:rPr lang="en-US" dirty="0" smtClean="0"/>
-              <a:t>)</a:t>
-            </a:r>
-          </a:p>
-          <a:p>
-            <a:pPr marL="514350" indent="-514350">
-              <a:buFont typeface="Arial" pitchFamily="34" charset="0"/>
-              <a:buChar char="•"/>
-            </a:pPr>
-            <a:r>
-              <a:rPr lang="en-US" dirty="0" smtClean="0"/>
-              <a:t>Objection Handling (</a:t>
-            </a:r>
-            <a:r>
-              <a:rPr lang="en-US" dirty="0"/>
-              <a:t>address as possible)</a:t>
-            </a:r>
-          </a:p>
-          <a:p>
-            <a:pPr marL="514350" indent="-514350">
-              <a:buFont typeface="Arial" pitchFamily="34" charset="0"/>
-              <a:buChar char="•"/>
-            </a:pPr>
-            <a:endParaRPr lang="en-US" dirty="0" smtClean="0"/>
-          </a:p>
-          <a:p>
-            <a:pPr marL="514350" indent="-514350">
-              <a:buFont typeface="Arial" pitchFamily="34" charset="0"/>
-              <a:buChar char="•"/>
-            </a:pPr>
+              <a:t>Bullet point</a:t>
+            </a:r>
             <a:endParaRPr lang="en-US" dirty="0"/>
           </a:p>
         </p:txBody>
@@ -7045,7 +8227,7 @@
     </p:spTree>
     <p:extLst>
       <p:ext uri="{BB962C8B-B14F-4D97-AF65-F5344CB8AC3E}">
-        <p14:creationId xmlns:p14="http://schemas.microsoft.com/office/powerpoint/2010/main" val="3280943969"/>
+        <p14:creationId xmlns:p14="http://schemas.microsoft.com/office/powerpoint/2010/main" val="2201155064"/>
       </p:ext>
     </p:extLst>
   </p:cSld>
@@ -7053,6 +8235,13 @@
     <a:masterClrMapping/>
   </p:clrMapOvr>
   <p:transition/>
+  <p:timing>
+    <p:tnLst>
+      <p:par>
+        <p:cTn id="1" dur="indefinite" restart="never" nodeType="tmRoot"/>
+      </p:par>
+    </p:tnLst>
+  </p:timing>
 </p:sld>
 </file>
 
@@ -7075,29 +8264,6 @@
       </p:grpSpPr>
       <p:sp>
         <p:nvSpPr>
-          <p:cNvPr id="2" name="Title 1"/>
-          <p:cNvSpPr>
-            <a:spLocks noGrp="1"/>
-          </p:cNvSpPr>
-          <p:nvPr>
-            <p:ph type="title"/>
-          </p:nvPr>
-        </p:nvSpPr>
-        <p:spPr/>
-        <p:txBody>
-          <a:bodyPr/>
-          <a:lstStyle/>
-          <a:p>
-            <a:r>
-              <a:rPr lang="en-US" sz="3200" dirty="0" smtClean="0"/>
-              <a:t>Blank Slide(s) for your presentation 2</a:t>
-            </a:r>
-            <a:endParaRPr lang="en-US" sz="3200" dirty="0"/>
-          </a:p>
-        </p:txBody>
-      </p:sp>
-      <p:sp>
-        <p:nvSpPr>
           <p:cNvPr id="3" name="TextBox 2"/>
           <p:cNvSpPr txBox="1"/>
           <p:nvPr/>
@@ -7105,7 +8271,7 @@
         <p:spPr>
           <a:xfrm>
             <a:off x="593725" y="481198"/>
-            <a:ext cx="7809681" cy="839257"/>
+            <a:ext cx="7021003" cy="839257"/>
           </a:xfrm>
           <a:prstGeom prst="rect">
             <a:avLst/>
@@ -7148,7 +8314,7 @@
                 <a:cs typeface="Calibri" pitchFamily="34" charset="0"/>
                 <a:sym typeface="Arial" pitchFamily="34" charset="0"/>
               </a:rPr>
-              <a:t>Presentation</a:t>
+              <a:t>Summary</a:t>
             </a:r>
             <a:endParaRPr lang="en-US" sz="4600" dirty="0"/>
           </a:p>
@@ -7163,7 +8329,7 @@
         <p:spPr>
           <a:xfrm>
             <a:off x="593726" y="1846176"/>
-            <a:ext cx="5480197" cy="562258"/>
+            <a:ext cx="2101388" cy="562258"/>
           </a:xfrm>
           <a:prstGeom prst="rect">
             <a:avLst/>
@@ -7183,21 +8349,132 @@
                 </a:solidFill>
                 <a:cs typeface="Calibri" pitchFamily="34" charset="0"/>
               </a:rPr>
-              <a:t>Title of your Presentation Topic 2</a:t>
-            </a:r>
-            <a:endParaRPr lang="en-US" sz="2800" dirty="0">
-              <a:solidFill>
-                <a:srgbClr val="FFAA00"/>
-              </a:solidFill>
-              <a:cs typeface="Calibri" pitchFamily="34" charset="0"/>
-            </a:endParaRPr>
+              <a:t>Summary 1</a:t>
+            </a:r>
+          </a:p>
+        </p:txBody>
+      </p:sp>
+      <p:sp>
+        <p:nvSpPr>
+          <p:cNvPr id="5" name="Rectangle 4"/>
+          <p:cNvSpPr/>
+          <p:nvPr/>
+        </p:nvSpPr>
+        <p:spPr>
+          <a:xfrm>
+            <a:off x="1171575" y="2408434"/>
+            <a:ext cx="7570534" cy="3293209"/>
+          </a:xfrm>
+          <a:prstGeom prst="rect">
+            <a:avLst/>
+          </a:prstGeom>
+        </p:spPr>
+        <p:txBody>
+          <a:bodyPr wrap="none">
+            <a:spAutoFit/>
+          </a:bodyPr>
+          <a:lstStyle/>
+          <a:p>
+            <a:endParaRPr lang="en-US" dirty="0" smtClean="0"/>
+          </a:p>
+          <a:p>
+            <a:pPr marL="514350" indent="-514350">
+              <a:buFont typeface="Arial" pitchFamily="34" charset="0"/>
+              <a:buChar char="•"/>
+            </a:pPr>
+            <a:r>
+              <a:rPr lang="en-US" dirty="0" smtClean="0"/>
+              <a:t>Target Audience (address as possible)</a:t>
+            </a:r>
+          </a:p>
+          <a:p>
+            <a:pPr marL="514350" indent="-514350">
+              <a:buFont typeface="Arial" pitchFamily="34" charset="0"/>
+              <a:buChar char="•"/>
+            </a:pPr>
+            <a:r>
+              <a:rPr lang="en-US" dirty="0" smtClean="0"/>
+              <a:t>Opportunity (</a:t>
+            </a:r>
+            <a:r>
+              <a:rPr lang="en-US" dirty="0"/>
+              <a:t>address as possible</a:t>
+            </a:r>
+            <a:r>
+              <a:rPr lang="en-US" dirty="0" smtClean="0"/>
+              <a:t>)</a:t>
+            </a:r>
+          </a:p>
+          <a:p>
+            <a:pPr marL="514350" indent="-514350">
+              <a:buFont typeface="Arial" pitchFamily="34" charset="0"/>
+              <a:buChar char="•"/>
+            </a:pPr>
+            <a:r>
+              <a:rPr lang="en-US" dirty="0" smtClean="0"/>
+              <a:t>Benefits (</a:t>
+            </a:r>
+            <a:r>
+              <a:rPr lang="en-US" dirty="0"/>
+              <a:t>address as possible</a:t>
+            </a:r>
+            <a:r>
+              <a:rPr lang="en-US" dirty="0" smtClean="0"/>
+              <a:t>)</a:t>
+            </a:r>
+          </a:p>
+          <a:p>
+            <a:pPr marL="514350" indent="-514350">
+              <a:buFont typeface="Arial" pitchFamily="34" charset="0"/>
+              <a:buChar char="•"/>
+            </a:pPr>
+            <a:r>
+              <a:rPr lang="en-US" dirty="0" smtClean="0"/>
+              <a:t>Competitive Advantages (</a:t>
+            </a:r>
+            <a:r>
+              <a:rPr lang="en-US" dirty="0"/>
+              <a:t>address as possible</a:t>
+            </a:r>
+            <a:r>
+              <a:rPr lang="en-US" dirty="0" smtClean="0"/>
+              <a:t>)</a:t>
+            </a:r>
+          </a:p>
+          <a:p>
+            <a:pPr marL="514350" indent="-514350">
+              <a:buFont typeface="Arial" pitchFamily="34" charset="0"/>
+              <a:buChar char="•"/>
+            </a:pPr>
+            <a:r>
+              <a:rPr lang="en-US" dirty="0" smtClean="0"/>
+              <a:t>Objection Handling (</a:t>
+            </a:r>
+            <a:r>
+              <a:rPr lang="en-US" dirty="0"/>
+              <a:t>address as possible)</a:t>
+            </a:r>
+          </a:p>
+          <a:p>
+            <a:pPr marL="514350" indent="-514350">
+              <a:buFont typeface="Arial" pitchFamily="34" charset="0"/>
+              <a:buChar char="•"/>
+            </a:pPr>
+            <a:endParaRPr lang="en-US" dirty="0" smtClean="0"/>
+          </a:p>
+          <a:p>
+            <a:pPr marL="514350" indent="-514350">
+              <a:buFont typeface="Arial" pitchFamily="34" charset="0"/>
+              <a:buChar char="•"/>
+            </a:pPr>
+            <a:endParaRPr lang="en-US" dirty="0"/>
           </a:p>
         </p:txBody>
       </p:sp>
     </p:spTree>
     <p:extLst>
       <p:ext uri="{BB962C8B-B14F-4D97-AF65-F5344CB8AC3E}">
-        <p14:creationId xmlns:p14="http://schemas.microsoft.com/office/powerpoint/2010/main" val="1993206730"/>
+        <p14:creationId xmlns:p14="http://schemas.microsoft.com/office/powerpoint/2010/main" val="3280943969"/>
       </p:ext>
     </p:extLst>
   </p:cSld>
@@ -7205,6 +8482,13 @@
     <a:masterClrMapping/>
   </p:clrMapOvr>
   <p:transition/>
+  <p:timing>
+    <p:tnLst>
+      <p:par>
+        <p:cTn id="1" dur="indefinite" restart="never" nodeType="tmRoot"/>
+      </p:par>
+    </p:tnLst>
+  </p:timing>
 </p:sld>
 </file>
 
@@ -7235,19 +8519,14 @@
             <p:ph type="title"/>
           </p:nvPr>
         </p:nvSpPr>
-        <p:spPr>
-          <a:xfrm>
-            <a:off x="593725" y="4573587"/>
-            <a:ext cx="11762080" cy="3962400"/>
-          </a:xfrm>
-        </p:spPr>
+        <p:spPr/>
         <p:txBody>
           <a:bodyPr/>
           <a:lstStyle/>
           <a:p>
             <a:r>
               <a:rPr lang="en-US" sz="3200" dirty="0" smtClean="0"/>
-              <a:t>&lt;Insert an image from your demonstration here&gt;</a:t>
+              <a:t>Blank Slide(s) for your presentation 2</a:t>
             </a:r>
             <a:endParaRPr lang="en-US" sz="3200" dirty="0"/>
           </a:p>
@@ -7262,7 +8541,7 @@
         <p:spPr>
           <a:xfrm>
             <a:off x="593725" y="481198"/>
-            <a:ext cx="8335466" cy="839257"/>
+            <a:ext cx="7809681" cy="839257"/>
           </a:xfrm>
           <a:prstGeom prst="rect">
             <a:avLst/>
@@ -7305,7 +8584,7 @@
                 <a:cs typeface="Calibri" pitchFamily="34" charset="0"/>
                 <a:sym typeface="Arial" pitchFamily="34" charset="0"/>
               </a:rPr>
-              <a:t>Demonstration</a:t>
+              <a:t>Presentation</a:t>
             </a:r>
             <a:endParaRPr lang="en-US" sz="4600" dirty="0"/>
           </a:p>
@@ -7320,7 +8599,7 @@
         <p:spPr>
           <a:xfrm>
             <a:off x="593726" y="1846176"/>
-            <a:ext cx="4067759" cy="562258"/>
+            <a:ext cx="5480197" cy="562258"/>
           </a:xfrm>
           <a:prstGeom prst="rect">
             <a:avLst/>
@@ -7340,74 +8619,21 @@
                 </a:solidFill>
                 <a:cs typeface="Calibri" pitchFamily="34" charset="0"/>
               </a:rPr>
-              <a:t>Title of Demonstration 2</a:t>
-            </a:r>
-          </a:p>
-        </p:txBody>
-      </p:sp>
-      <p:sp>
-        <p:nvSpPr>
-          <p:cNvPr id="5" name="Rectangle 4"/>
-          <p:cNvSpPr/>
-          <p:nvPr/>
-        </p:nvSpPr>
-        <p:spPr>
-          <a:xfrm>
-            <a:off x="1171575" y="2408434"/>
-            <a:ext cx="7364517" cy="1692771"/>
-          </a:xfrm>
-          <a:prstGeom prst="rect">
-            <a:avLst/>
-          </a:prstGeom>
-        </p:spPr>
-        <p:txBody>
-          <a:bodyPr wrap="none">
-            <a:spAutoFit/>
-          </a:bodyPr>
-          <a:lstStyle/>
-          <a:p>
-            <a:r>
-              <a:rPr lang="en-US" dirty="0" smtClean="0"/>
-              <a:t>In this Demonstration we will cover the following:</a:t>
-            </a:r>
-          </a:p>
-          <a:p>
-            <a:pPr marL="514350" indent="-514350">
-              <a:buFont typeface="Arial" pitchFamily="34" charset="0"/>
-              <a:buChar char="•"/>
-            </a:pPr>
-            <a:r>
-              <a:rPr lang="en-US" dirty="0" smtClean="0"/>
-              <a:t>Bullet point</a:t>
-            </a:r>
-          </a:p>
-          <a:p>
-            <a:pPr marL="514350" indent="-514350">
-              <a:buFont typeface="Arial" pitchFamily="34" charset="0"/>
-              <a:buChar char="•"/>
-            </a:pPr>
-            <a:r>
-              <a:rPr lang="en-US" dirty="0" smtClean="0"/>
-              <a:t>Bullet point</a:t>
-            </a:r>
-          </a:p>
-          <a:p>
-            <a:pPr marL="514350" indent="-514350">
-              <a:buFont typeface="Arial" pitchFamily="34" charset="0"/>
-              <a:buChar char="•"/>
-            </a:pPr>
-            <a:r>
-              <a:rPr lang="en-US" dirty="0" smtClean="0"/>
-              <a:t>Bullet point</a:t>
-            </a:r>
-            <a:endParaRPr lang="en-US" dirty="0"/>
+              <a:t>Title of your Presentation Topic 2</a:t>
+            </a:r>
+            <a:endParaRPr lang="en-US" sz="2800" dirty="0">
+              <a:solidFill>
+                <a:srgbClr val="FFAA00"/>
+              </a:solidFill>
+              <a:cs typeface="Calibri" pitchFamily="34" charset="0"/>
+            </a:endParaRPr>
           </a:p>
         </p:txBody>
       </p:sp>
     </p:spTree>
     <p:extLst>
       <p:ext uri="{BB962C8B-B14F-4D97-AF65-F5344CB8AC3E}">
-        <p14:creationId xmlns:p14="http://schemas.microsoft.com/office/powerpoint/2010/main" val="3218212969"/>
+        <p14:creationId xmlns:p14="http://schemas.microsoft.com/office/powerpoint/2010/main" val="1993206730"/>
       </p:ext>
     </p:extLst>
   </p:cSld>
@@ -7457,15 +8683,7 @@
           <a:p>
             <a:r>
               <a:rPr lang="en-US" sz="3200" dirty="0" smtClean="0"/>
-              <a:t>&lt;Insert an image from the completed </a:t>
-            </a:r>
-            <a:r>
-              <a:rPr lang="en-US" sz="3200" dirty="0"/>
-              <a:t>e</a:t>
-            </a:r>
-            <a:r>
-              <a:rPr lang="en-US" sz="3200" dirty="0" smtClean="0"/>
-              <a:t>xercise here&gt;</a:t>
+              <a:t>&lt;Insert an image from your demonstration here&gt;</a:t>
             </a:r>
             <a:endParaRPr lang="en-US" sz="3200" dirty="0"/>
           </a:p>
@@ -7480,7 +8698,7 @@
         <p:spPr>
           <a:xfrm>
             <a:off x="593725" y="481198"/>
-            <a:ext cx="6758111" cy="839257"/>
+            <a:ext cx="8335466" cy="839257"/>
           </a:xfrm>
           <a:prstGeom prst="rect">
             <a:avLst/>
@@ -7523,7 +8741,7 @@
                 <a:cs typeface="Calibri" pitchFamily="34" charset="0"/>
                 <a:sym typeface="Arial" pitchFamily="34" charset="0"/>
               </a:rPr>
-              <a:t>Exercise</a:t>
+              <a:t>Demonstration</a:t>
             </a:r>
             <a:endParaRPr lang="en-US" sz="4600" dirty="0"/>
           </a:p>
@@ -7538,7 +8756,7 @@
         <p:spPr>
           <a:xfrm>
             <a:off x="593726" y="1846176"/>
-            <a:ext cx="3105957" cy="562258"/>
+            <a:ext cx="4067759" cy="562258"/>
           </a:xfrm>
           <a:prstGeom prst="rect">
             <a:avLst/>
@@ -7558,7 +8776,7 @@
                 </a:solidFill>
                 <a:cs typeface="Calibri" pitchFamily="34" charset="0"/>
               </a:rPr>
-              <a:t>Title of Exercise 2</a:t>
+              <a:t>Title of Demonstration 2</a:t>
             </a:r>
           </a:p>
         </p:txBody>
@@ -7572,7 +8790,7 @@
         <p:spPr>
           <a:xfrm>
             <a:off x="1171575" y="2408434"/>
-            <a:ext cx="7104830" cy="1692771"/>
+            <a:ext cx="7364517" cy="1692771"/>
           </a:xfrm>
           <a:prstGeom prst="rect">
             <a:avLst/>
@@ -7586,7 +8804,7 @@
           <a:p>
             <a:r>
               <a:rPr lang="en-US" dirty="0" smtClean="0"/>
-              <a:t>In this Exercise you will perform the following:</a:t>
+              <a:t>In this Demonstration we will cover the following:</a:t>
             </a:r>
           </a:p>
           <a:p>
@@ -7625,7 +8843,7 @@
     </p:spTree>
     <p:extLst>
       <p:ext uri="{BB962C8B-B14F-4D97-AF65-F5344CB8AC3E}">
-        <p14:creationId xmlns:p14="http://schemas.microsoft.com/office/powerpoint/2010/main" val="2752331491"/>
+        <p14:creationId xmlns:p14="http://schemas.microsoft.com/office/powerpoint/2010/main" val="3218212969"/>
       </p:ext>
     </p:extLst>
   </p:cSld>
@@ -9409,6 +10627,21 @@
 </file>
 
 <file path=customXml/item1.xml><?xml version="1.0" encoding="utf-8"?>
+<?mso-contentType ?>
+<FormTemplates xmlns="http://schemas.microsoft.com/sharepoint/v3/contenttype/forms">
+  <Display>DocumentLibraryForm</Display>
+  <Edit>DocumentLibraryForm</Edit>
+  <New>DocumentLibraryForm</New>
+</FormTemplates>
+</file>
+
+<file path=customXml/item2.xml><?xml version="1.0" encoding="utf-8"?>
+<p:properties xmlns:p="http://schemas.microsoft.com/office/2006/metadata/properties" xmlns:xsi="http://www.w3.org/2001/XMLSchema-instance">
+  <documentManagement/>
+</p:properties>
+</file>
+
+<file path=customXml/item3.xml><?xml version="1.0" encoding="utf-8"?>
 <ct:contentTypeSchema xmlns:ct="http://schemas.microsoft.com/office/2006/metadata/contentType" xmlns:ma="http://schemas.microsoft.com/office/2006/metadata/properties/metaAttributes" ct:_="" ma:_="" ma:contentTypeName="Document" ma:contentTypeID="0x0101005C411FEDA499084183CB15D739B42D88" ma:contentTypeVersion="0" ma:contentTypeDescription="Create a new document." ma:contentTypeScope="" ma:versionID="e854bbbf40a9d17ed94d2b4b3c9444c7">
   <xsd:schema xmlns:xsd="http://www.w3.org/2001/XMLSchema" xmlns:xs="http://www.w3.org/2001/XMLSchema" xmlns:p="http://schemas.microsoft.com/office/2006/metadata/properties" targetNamespace="http://schemas.microsoft.com/office/2006/metadata/properties" ma:root="true" ma:fieldsID="393adde7ee1a707d6e9f5d1307480844">
     <xsd:element name="properties">
@@ -9522,22 +10755,30 @@
 </ct:contentTypeSchema>
 </file>
 
-<file path=customXml/item2.xml><?xml version="1.0" encoding="utf-8"?>
-<p:properties xmlns:p="http://schemas.microsoft.com/office/2006/metadata/properties" xmlns:xsi="http://www.w3.org/2001/XMLSchema-instance">
-  <documentManagement/>
-</p:properties>
+<file path=customXml/itemProps1.xml><?xml version="1.0" encoding="utf-8"?>
+<ds:datastoreItem xmlns:ds="http://schemas.openxmlformats.org/officeDocument/2006/customXml" ds:itemID="{05DE7D26-623C-4E20-905C-E4AA82C27D5E}">
+  <ds:schemaRefs>
+    <ds:schemaRef ds:uri="http://schemas.microsoft.com/sharepoint/v3/contenttype/forms"/>
+  </ds:schemaRefs>
+</ds:datastoreItem>
 </file>
 
-<file path=customXml/item3.xml><?xml version="1.0" encoding="utf-8"?>
-<?mso-contentType ?>
-<FormTemplates xmlns="http://schemas.microsoft.com/sharepoint/v3/contenttype/forms">
-  <Display>DocumentLibraryForm</Display>
-  <Edit>DocumentLibraryForm</Edit>
-  <New>DocumentLibraryForm</New>
-</FormTemplates>
+<file path=customXml/itemProps2.xml><?xml version="1.0" encoding="utf-8"?>
+<ds:datastoreItem xmlns:ds="http://schemas.openxmlformats.org/officeDocument/2006/customXml" ds:itemID="{AA38C631-2E87-4D85-8548-5D452E157EE2}">
+  <ds:schemaRefs>
+    <ds:schemaRef ds:uri="http://purl.org/dc/terms/"/>
+    <ds:schemaRef ds:uri="http://purl.org/dc/dcmitype/"/>
+    <ds:schemaRef ds:uri="http://schemas.microsoft.com/office/infopath/2007/PartnerControls"/>
+    <ds:schemaRef ds:uri="http://www.w3.org/XML/1998/namespace"/>
+    <ds:schemaRef ds:uri="http://purl.org/dc/elements/1.1/"/>
+    <ds:schemaRef ds:uri="http://schemas.openxmlformats.org/package/2006/metadata/core-properties"/>
+    <ds:schemaRef ds:uri="http://schemas.microsoft.com/office/2006/documentManagement/types"/>
+    <ds:schemaRef ds:uri="http://schemas.microsoft.com/office/2006/metadata/properties"/>
+  </ds:schemaRefs>
+</ds:datastoreItem>
 </file>
 
-<file path=customXml/itemProps1.xml><?xml version="1.0" encoding="utf-8"?>
+<file path=customXml/itemProps3.xml><?xml version="1.0" encoding="utf-8"?>
 <ds:datastoreItem xmlns:ds="http://schemas.openxmlformats.org/officeDocument/2006/customXml" ds:itemID="{59F81734-0E85-41E2-B450-5A505E25DF2F}">
   <ds:schemaRefs>
     <ds:schemaRef ds:uri="http://schemas.microsoft.com/office/2006/metadata/contentType"/>
@@ -9551,27 +10792,4 @@
     <ds:schemaRef ds:uri="http://schemas.microsoft.com/office/infopath/2007/PartnerControls"/>
   </ds:schemaRefs>
 </ds:datastoreItem>
-</file>
-
-<file path=customXml/itemProps2.xml><?xml version="1.0" encoding="utf-8"?>
-<ds:datastoreItem xmlns:ds="http://schemas.openxmlformats.org/officeDocument/2006/customXml" ds:itemID="{AA38C631-2E87-4D85-8548-5D452E157EE2}">
-  <ds:schemaRefs>
-    <ds:schemaRef ds:uri="http://schemas.microsoft.com/office/infopath/2007/PartnerControls"/>
-    <ds:schemaRef ds:uri="http://schemas.openxmlformats.org/package/2006/metadata/core-properties"/>
-    <ds:schemaRef ds:uri="http://schemas.microsoft.com/office/2006/metadata/properties"/>
-    <ds:schemaRef ds:uri="http://purl.org/dc/terms/"/>
-    <ds:schemaRef ds:uri="http://purl.org/dc/dcmitype/"/>
-    <ds:schemaRef ds:uri="http://purl.org/dc/elements/1.1/"/>
-    <ds:schemaRef ds:uri="http://schemas.microsoft.com/office/2006/documentManagement/types"/>
-    <ds:schemaRef ds:uri="http://www.w3.org/XML/1998/namespace"/>
-  </ds:schemaRefs>
-</ds:datastoreItem>
-</file>
-
-<file path=customXml/itemProps3.xml><?xml version="1.0" encoding="utf-8"?>
-<ds:datastoreItem xmlns:ds="http://schemas.openxmlformats.org/officeDocument/2006/customXml" ds:itemID="{05DE7D26-623C-4E20-905C-E4AA82C27D5E}">
-  <ds:schemaRefs>
-    <ds:schemaRef ds:uri="http://schemas.microsoft.com/sharepoint/v3/contenttype/forms"/>
-  </ds:schemaRefs>
-</ds:datastoreItem>
 </file>
</xml_diff>

<commit_message>
fix blank line jump:this is a feature, not a bug
</commit_message>
<xml_diff>
--- a/docs/finalppt_f.pptx
+++ b/docs/finalppt_f.pptx
@@ -277,7 +277,7 @@
               <a:pPr>
                 <a:defRPr/>
               </a:pPr>
-              <a:t>5/27/2012</a:t>
+              <a:t>5/28/2012</a:t>
             </a:fld>
             <a:endParaRPr lang="en-US" dirty="0"/>
           </a:p>
@@ -500,7 +500,7 @@
               <a:pPr>
                 <a:defRPr/>
               </a:pPr>
-              <a:t>5/27/2012</a:t>
+              <a:t>5/28/2012</a:t>
             </a:fld>
             <a:endParaRPr lang="en-US" dirty="0"/>
           </a:p>
@@ -7456,17 +7456,7 @@
                 <a:latin typeface="黑体" pitchFamily="49" charset="-122"/>
                 <a:ea typeface="黑体" pitchFamily="49" charset="-122"/>
               </a:rPr>
-              <a:t>鱼眼视</a:t>
-            </a:r>
-            <a:r>
-              <a:rPr lang="zh-CN" altLang="en-US" sz="5100" dirty="0" smtClean="0">
-                <a:solidFill>
-                  <a:srgbClr val="FFFFFF"/>
-                </a:solidFill>
-                <a:latin typeface="黑体" pitchFamily="49" charset="-122"/>
-                <a:ea typeface="黑体" pitchFamily="49" charset="-122"/>
-              </a:rPr>
-              <a:t>图和源代码展示</a:t>
+              <a:t>鱼眼视图和源代码展示</a:t>
             </a:r>
             <a:endParaRPr lang="en-US" sz="5100" dirty="0">
               <a:solidFill>
@@ -7488,7 +7478,7 @@
         </p:nvSpPr>
         <p:spPr>
           <a:xfrm>
-            <a:off x="561975" y="1830387"/>
+            <a:off x="514350" y="1601787"/>
             <a:ext cx="11762080" cy="6699652"/>
           </a:xfrm>
           <a:prstGeom prst="rect">
@@ -7724,11 +7714,7 @@
             </a:r>
             <a:r>
               <a:rPr lang="en-US" altLang="zh-CN" sz="4100" dirty="0" smtClean="0"/>
-              <a:t> </a:t>
-            </a:r>
-            <a:r>
-              <a:rPr lang="en-US" altLang="zh-CN" sz="4100" smtClean="0"/>
-              <a:t>Furnas</a:t>
+              <a:t> Furnas</a:t>
             </a:r>
           </a:p>
           <a:p>
@@ -7782,6 +7768,70 @@
           </a:p>
         </p:txBody>
       </p:sp>
+      <p:pic>
+        <p:nvPicPr>
+          <p:cNvPr id="1026" name="Picture 2"/>
+          <p:cNvPicPr>
+            <a:picLocks noChangeAspect="1" noChangeArrowheads="1"/>
+          </p:cNvPicPr>
+          <p:nvPr/>
+        </p:nvPicPr>
+        <p:blipFill>
+          <a:blip r:embed="rId3">
+            <a:extLst>
+              <a:ext uri="{28A0092B-C50C-407E-A947-70E740481C1C}">
+                <a14:useLocalDpi xmlns:a14="http://schemas.microsoft.com/office/drawing/2010/main" val="0"/>
+              </a:ext>
+            </a:extLst>
+          </a:blip>
+          <a:srcRect/>
+          <a:stretch>
+            <a:fillRect/>
+          </a:stretch>
+        </p:blipFill>
+        <p:spPr bwMode="auto">
+          <a:xfrm>
+            <a:off x="1223315" y="2592387"/>
+            <a:ext cx="10439400" cy="6157190"/>
+          </a:xfrm>
+          <a:prstGeom prst="rect">
+            <a:avLst/>
+          </a:prstGeom>
+          <a:noFill/>
+          <a:ln>
+            <a:noFill/>
+          </a:ln>
+          <a:effectLst/>
+          <a:extLst>
+            <a:ext uri="{909E8E84-426E-40DD-AFC4-6F175D3DCCD1}">
+              <a14:hiddenFill xmlns:a14="http://schemas.microsoft.com/office/drawing/2010/main">
+                <a:solidFill>
+                  <a:schemeClr val="accent1"/>
+                </a:solidFill>
+              </a14:hiddenFill>
+            </a:ext>
+            <a:ext uri="{91240B29-F687-4F45-9708-019B960494DF}">
+              <a14:hiddenLine xmlns:a14="http://schemas.microsoft.com/office/drawing/2010/main" w="9525">
+                <a:solidFill>
+                  <a:schemeClr val="tx1"/>
+                </a:solidFill>
+                <a:miter lim="800000"/>
+                <a:headEnd/>
+                <a:tailEnd/>
+              </a14:hiddenLine>
+            </a:ext>
+            <a:ext uri="{AF507438-7753-43E0-B8FC-AC1667EBCBE1}">
+              <a14:hiddenEffects xmlns:a14="http://schemas.microsoft.com/office/drawing/2010/main">
+                <a:effectLst>
+                  <a:outerShdw dist="35921" dir="2700000" algn="ctr" rotWithShape="0">
+                    <a:schemeClr val="bg2"/>
+                  </a:outerShdw>
+                </a:effectLst>
+              </a14:hiddenEffects>
+            </a:ext>
+          </a:extLst>
+        </p:spPr>
+      </p:pic>
     </p:spTree>
     <p:extLst>
       <p:ext uri="{BB962C8B-B14F-4D97-AF65-F5344CB8AC3E}">
@@ -10627,21 +10677,6 @@
 </file>
 
 <file path=customXml/item1.xml><?xml version="1.0" encoding="utf-8"?>
-<?mso-contentType ?>
-<FormTemplates xmlns="http://schemas.microsoft.com/sharepoint/v3/contenttype/forms">
-  <Display>DocumentLibraryForm</Display>
-  <Edit>DocumentLibraryForm</Edit>
-  <New>DocumentLibraryForm</New>
-</FormTemplates>
-</file>
-
-<file path=customXml/item2.xml><?xml version="1.0" encoding="utf-8"?>
-<p:properties xmlns:p="http://schemas.microsoft.com/office/2006/metadata/properties" xmlns:xsi="http://www.w3.org/2001/XMLSchema-instance">
-  <documentManagement/>
-</p:properties>
-</file>
-
-<file path=customXml/item3.xml><?xml version="1.0" encoding="utf-8"?>
 <ct:contentTypeSchema xmlns:ct="http://schemas.microsoft.com/office/2006/metadata/contentType" xmlns:ma="http://schemas.microsoft.com/office/2006/metadata/properties/metaAttributes" ct:_="" ma:_="" ma:contentTypeName="Document" ma:contentTypeID="0x0101005C411FEDA499084183CB15D739B42D88" ma:contentTypeVersion="0" ma:contentTypeDescription="Create a new document." ma:contentTypeScope="" ma:versionID="e854bbbf40a9d17ed94d2b4b3c9444c7">
   <xsd:schema xmlns:xsd="http://www.w3.org/2001/XMLSchema" xmlns:xs="http://www.w3.org/2001/XMLSchema" xmlns:p="http://schemas.microsoft.com/office/2006/metadata/properties" targetNamespace="http://schemas.microsoft.com/office/2006/metadata/properties" ma:root="true" ma:fieldsID="393adde7ee1a707d6e9f5d1307480844">
     <xsd:element name="properties">
@@ -10755,10 +10790,33 @@
 </ct:contentTypeSchema>
 </file>
 
+<file path=customXml/item2.xml><?xml version="1.0" encoding="utf-8"?>
+<p:properties xmlns:p="http://schemas.microsoft.com/office/2006/metadata/properties" xmlns:xsi="http://www.w3.org/2001/XMLSchema-instance">
+  <documentManagement/>
+</p:properties>
+</file>
+
+<file path=customXml/item3.xml><?xml version="1.0" encoding="utf-8"?>
+<?mso-contentType ?>
+<FormTemplates xmlns="http://schemas.microsoft.com/sharepoint/v3/contenttype/forms">
+  <Display>DocumentLibraryForm</Display>
+  <Edit>DocumentLibraryForm</Edit>
+  <New>DocumentLibraryForm</New>
+</FormTemplates>
+</file>
+
 <file path=customXml/itemProps1.xml><?xml version="1.0" encoding="utf-8"?>
-<ds:datastoreItem xmlns:ds="http://schemas.openxmlformats.org/officeDocument/2006/customXml" ds:itemID="{05DE7D26-623C-4E20-905C-E4AA82C27D5E}">
+<ds:datastoreItem xmlns:ds="http://schemas.openxmlformats.org/officeDocument/2006/customXml" ds:itemID="{59F81734-0E85-41E2-B450-5A505E25DF2F}">
   <ds:schemaRefs>
-    <ds:schemaRef ds:uri="http://schemas.microsoft.com/sharepoint/v3/contenttype/forms"/>
+    <ds:schemaRef ds:uri="http://schemas.microsoft.com/office/2006/metadata/contentType"/>
+    <ds:schemaRef ds:uri="http://schemas.microsoft.com/office/2006/metadata/properties/metaAttributes"/>
+    <ds:schemaRef ds:uri="http://www.w3.org/2001/XMLSchema"/>
+    <ds:schemaRef ds:uri="http://schemas.microsoft.com/office/2006/metadata/properties"/>
+    <ds:schemaRef ds:uri="http://schemas.openxmlformats.org/package/2006/metadata/core-properties"/>
+    <ds:schemaRef ds:uri="http://purl.org/dc/elements/1.1/"/>
+    <ds:schemaRef ds:uri="http://purl.org/dc/terms/"/>
+    <ds:schemaRef ds:uri="http://schemas.microsoft.com/internal/obd"/>
+    <ds:schemaRef ds:uri="http://schemas.microsoft.com/office/infopath/2007/PartnerControls"/>
   </ds:schemaRefs>
 </ds:datastoreItem>
 </file>
@@ -10779,17 +10837,9 @@
 </file>
 
 <file path=customXml/itemProps3.xml><?xml version="1.0" encoding="utf-8"?>
-<ds:datastoreItem xmlns:ds="http://schemas.openxmlformats.org/officeDocument/2006/customXml" ds:itemID="{59F81734-0E85-41E2-B450-5A505E25DF2F}">
+<ds:datastoreItem xmlns:ds="http://schemas.openxmlformats.org/officeDocument/2006/customXml" ds:itemID="{05DE7D26-623C-4E20-905C-E4AA82C27D5E}">
   <ds:schemaRefs>
-    <ds:schemaRef ds:uri="http://schemas.microsoft.com/office/2006/metadata/contentType"/>
-    <ds:schemaRef ds:uri="http://schemas.microsoft.com/office/2006/metadata/properties/metaAttributes"/>
-    <ds:schemaRef ds:uri="http://www.w3.org/2001/XMLSchema"/>
-    <ds:schemaRef ds:uri="http://schemas.microsoft.com/office/2006/metadata/properties"/>
-    <ds:schemaRef ds:uri="http://schemas.openxmlformats.org/package/2006/metadata/core-properties"/>
-    <ds:schemaRef ds:uri="http://purl.org/dc/elements/1.1/"/>
-    <ds:schemaRef ds:uri="http://purl.org/dc/terms/"/>
-    <ds:schemaRef ds:uri="http://schemas.microsoft.com/internal/obd"/>
-    <ds:schemaRef ds:uri="http://schemas.microsoft.com/office/infopath/2007/PartnerControls"/>
+    <ds:schemaRef ds:uri="http://schemas.microsoft.com/sharepoint/v3/contenttype/forms"/>
   </ds:schemaRefs>
 </ds:datastoreItem>
 </file>
</xml_diff>